<commit_message>
updated database proposal & colored requirements
</commit_message>
<xml_diff>
--- a/doc/presentations/02_03_22_project_sketch.pptx
+++ b/doc/presentations/02_03_22_project_sketch.pptx
@@ -5,7 +5,7 @@
     <p:sldMasterId id="2147483648" r:id="rId1"/>
   </p:sldMasterIdLst>
   <p:notesMasterIdLst>
-    <p:notesMasterId r:id="rId8"/>
+    <p:notesMasterId r:id="rId11"/>
   </p:notesMasterIdLst>
   <p:sldIdLst>
     <p:sldId id="256" r:id="rId2"/>
@@ -13,7 +13,10 @@
     <p:sldId id="258" r:id="rId4"/>
     <p:sldId id="260" r:id="rId5"/>
     <p:sldId id="261" r:id="rId6"/>
-    <p:sldId id="259" r:id="rId7"/>
+    <p:sldId id="263" r:id="rId7"/>
+    <p:sldId id="262" r:id="rId8"/>
+    <p:sldId id="264" r:id="rId9"/>
+    <p:sldId id="259" r:id="rId10"/>
   </p:sldIdLst>
   <p:sldSz cx="12192000" cy="6858000"/>
   <p:notesSz cx="6858000" cy="9144000"/>
@@ -202,7 +205,7 @@
           <a:p>
             <a:fld id="{32D3377B-B692-4F8C-8BE9-143A32B75211}" type="datetimeFigureOut">
               <a:rPr lang="de-DE" smtClean="0"/>
-              <a:t>03.03.2022</a:t>
+              <a:t>04.03.2022</a:t>
             </a:fld>
             <a:endParaRPr lang="de-DE"/>
           </a:p>
@@ -700,7 +703,7 @@
           <a:p>
             <a:fld id="{1887EDC2-B1DE-4E8C-96F7-0082F16C6727}" type="datetimeFigureOut">
               <a:rPr lang="de-DE" smtClean="0"/>
-              <a:t>03.03.2022</a:t>
+              <a:t>04.03.2022</a:t>
             </a:fld>
             <a:endParaRPr lang="de-DE"/>
           </a:p>
@@ -898,7 +901,7 @@
           <a:p>
             <a:fld id="{1887EDC2-B1DE-4E8C-96F7-0082F16C6727}" type="datetimeFigureOut">
               <a:rPr lang="de-DE" smtClean="0"/>
-              <a:t>03.03.2022</a:t>
+              <a:t>04.03.2022</a:t>
             </a:fld>
             <a:endParaRPr lang="de-DE"/>
           </a:p>
@@ -1106,7 +1109,7 @@
           <a:p>
             <a:fld id="{1887EDC2-B1DE-4E8C-96F7-0082F16C6727}" type="datetimeFigureOut">
               <a:rPr lang="de-DE" smtClean="0"/>
-              <a:t>03.03.2022</a:t>
+              <a:t>04.03.2022</a:t>
             </a:fld>
             <a:endParaRPr lang="de-DE"/>
           </a:p>
@@ -1304,7 +1307,7 @@
           <a:p>
             <a:fld id="{1887EDC2-B1DE-4E8C-96F7-0082F16C6727}" type="datetimeFigureOut">
               <a:rPr lang="de-DE" smtClean="0"/>
-              <a:t>03.03.2022</a:t>
+              <a:t>04.03.2022</a:t>
             </a:fld>
             <a:endParaRPr lang="de-DE"/>
           </a:p>
@@ -1579,7 +1582,7 @@
           <a:p>
             <a:fld id="{1887EDC2-B1DE-4E8C-96F7-0082F16C6727}" type="datetimeFigureOut">
               <a:rPr lang="de-DE" smtClean="0"/>
-              <a:t>03.03.2022</a:t>
+              <a:t>04.03.2022</a:t>
             </a:fld>
             <a:endParaRPr lang="de-DE"/>
           </a:p>
@@ -1844,7 +1847,7 @@
           <a:p>
             <a:fld id="{1887EDC2-B1DE-4E8C-96F7-0082F16C6727}" type="datetimeFigureOut">
               <a:rPr lang="de-DE" smtClean="0"/>
-              <a:t>03.03.2022</a:t>
+              <a:t>04.03.2022</a:t>
             </a:fld>
             <a:endParaRPr lang="de-DE"/>
           </a:p>
@@ -2256,7 +2259,7 @@
           <a:p>
             <a:fld id="{1887EDC2-B1DE-4E8C-96F7-0082F16C6727}" type="datetimeFigureOut">
               <a:rPr lang="de-DE" smtClean="0"/>
-              <a:t>03.03.2022</a:t>
+              <a:t>04.03.2022</a:t>
             </a:fld>
             <a:endParaRPr lang="de-DE"/>
           </a:p>
@@ -2397,7 +2400,7 @@
           <a:p>
             <a:fld id="{1887EDC2-B1DE-4E8C-96F7-0082F16C6727}" type="datetimeFigureOut">
               <a:rPr lang="de-DE" smtClean="0"/>
-              <a:t>03.03.2022</a:t>
+              <a:t>04.03.2022</a:t>
             </a:fld>
             <a:endParaRPr lang="de-DE"/>
           </a:p>
@@ -2510,7 +2513,7 @@
           <a:p>
             <a:fld id="{1887EDC2-B1DE-4E8C-96F7-0082F16C6727}" type="datetimeFigureOut">
               <a:rPr lang="de-DE" smtClean="0"/>
-              <a:t>03.03.2022</a:t>
+              <a:t>04.03.2022</a:t>
             </a:fld>
             <a:endParaRPr lang="de-DE"/>
           </a:p>
@@ -2821,7 +2824,7 @@
           <a:p>
             <a:fld id="{1887EDC2-B1DE-4E8C-96F7-0082F16C6727}" type="datetimeFigureOut">
               <a:rPr lang="de-DE" smtClean="0"/>
-              <a:t>03.03.2022</a:t>
+              <a:t>04.03.2022</a:t>
             </a:fld>
             <a:endParaRPr lang="de-DE"/>
           </a:p>
@@ -3109,7 +3112,7 @@
           <a:p>
             <a:fld id="{1887EDC2-B1DE-4E8C-96F7-0082F16C6727}" type="datetimeFigureOut">
               <a:rPr lang="de-DE" smtClean="0"/>
-              <a:t>03.03.2022</a:t>
+              <a:t>04.03.2022</a:t>
             </a:fld>
             <a:endParaRPr lang="de-DE"/>
           </a:p>
@@ -3350,7 +3353,7 @@
           <a:p>
             <a:fld id="{1887EDC2-B1DE-4E8C-96F7-0082F16C6727}" type="datetimeFigureOut">
               <a:rPr lang="de-DE" smtClean="0"/>
-              <a:t>03.03.2022</a:t>
+              <a:t>04.03.2022</a:t>
             </a:fld>
             <a:endParaRPr lang="de-DE"/>
           </a:p>
@@ -3788,7 +3791,18 @@
           <a:bodyPr/>
           <a:lstStyle/>
           <a:p>
-            <a:endParaRPr lang="de-DE"/>
+            <a:r>
+              <a:rPr lang="de-DE" dirty="0"/>
+              <a:t>Project Sketch</a:t>
+            </a:r>
+            <a:br>
+              <a:rPr lang="de-DE" dirty="0"/>
+            </a:br>
+            <a:r>
+              <a:rPr lang="de-DE" dirty="0" err="1"/>
+              <a:t>HerediVar</a:t>
+            </a:r>
+            <a:endParaRPr lang="de-DE" dirty="0"/>
           </a:p>
         </p:txBody>
       </p:sp>
@@ -3813,7 +3827,7 @@
           <a:bodyPr/>
           <a:lstStyle/>
           <a:p>
-            <a:endParaRPr lang="de-DE"/>
+            <a:endParaRPr lang="de-DE" dirty="0"/>
           </a:p>
         </p:txBody>
       </p:sp>
@@ -5349,7 +5363,7 @@
         </p:nvSpPr>
         <p:spPr>
           <a:xfrm>
-            <a:off x="6466374" y="3603661"/>
+            <a:off x="6491121" y="2913392"/>
             <a:ext cx="401288" cy="401288"/>
           </a:xfrm>
           <a:prstGeom prst="ellipse">
@@ -5483,6 +5497,50 @@
               <a:schemeClr val="tx1"/>
             </a:solidFill>
             <a:headEnd type="triangle"/>
+            <a:tailEnd type="triangle"/>
+          </a:ln>
+        </p:spPr>
+        <p:style>
+          <a:lnRef idx="1">
+            <a:schemeClr val="accent1"/>
+          </a:lnRef>
+          <a:fillRef idx="0">
+            <a:schemeClr val="accent1"/>
+          </a:fillRef>
+          <a:effectRef idx="0">
+            <a:schemeClr val="accent1"/>
+          </a:effectRef>
+          <a:fontRef idx="minor">
+            <a:schemeClr val="tx1"/>
+          </a:fontRef>
+        </p:style>
+      </p:cxnSp>
+      <p:cxnSp>
+        <p:nvCxnSpPr>
+          <p:cNvPr id="42" name="Gerade Verbindung mit Pfeil 41">
+            <a:extLst>
+              <a:ext uri="{FF2B5EF4-FFF2-40B4-BE49-F238E27FC236}">
+                <a16:creationId xmlns:a16="http://schemas.microsoft.com/office/drawing/2014/main" id="{A2757B6B-AC99-4D15-A6F3-596AB07D67E0}"/>
+              </a:ext>
+            </a:extLst>
+          </p:cNvPr>
+          <p:cNvCxnSpPr>
+            <a:cxnSpLocks/>
+          </p:cNvCxnSpPr>
+          <p:nvPr/>
+        </p:nvCxnSpPr>
+        <p:spPr>
+          <a:xfrm flipV="1">
+            <a:off x="5448581" y="1809145"/>
+            <a:ext cx="2288648" cy="1725194"/>
+          </a:xfrm>
+          <a:prstGeom prst="straightConnector1">
+            <a:avLst/>
+          </a:prstGeom>
+          <a:ln w="38100">
+            <a:solidFill>
+              <a:schemeClr val="tx1"/>
+            </a:solidFill>
             <a:tailEnd type="triangle"/>
           </a:ln>
         </p:spPr>
@@ -5554,7 +5612,9 @@
           </a:xfrm>
         </p:spPr>
         <p:txBody>
-          <a:bodyPr/>
+          <a:bodyPr>
+            <a:normAutofit lnSpcReduction="10000"/>
+          </a:bodyPr>
           <a:lstStyle/>
           <a:p>
             <a:pPr marL="0" indent="0">
@@ -6087,6 +6147,78 @@
             <a:r>
               <a:rPr lang="de-DE" dirty="0" err="1"/>
               <a:t>ClinVar</a:t>
+            </a:r>
+            <a:r>
+              <a:rPr lang="de-DE" dirty="0"/>
+              <a:t> (</a:t>
+            </a:r>
+            <a:r>
+              <a:rPr lang="de-DE" dirty="0" err="1"/>
+              <a:t>pdf</a:t>
+            </a:r>
+            <a:r>
+              <a:rPr lang="de-DE" dirty="0"/>
+              <a:t> </a:t>
+            </a:r>
+            <a:r>
+              <a:rPr lang="de-DE" dirty="0" err="1"/>
+              <a:t>with</a:t>
+            </a:r>
+            <a:r>
+              <a:rPr lang="de-DE" dirty="0"/>
+              <a:t> </a:t>
+            </a:r>
+            <a:r>
+              <a:rPr lang="de-DE" dirty="0" err="1"/>
+              <a:t>classification</a:t>
+            </a:r>
+            <a:r>
+              <a:rPr lang="de-DE" dirty="0"/>
+              <a:t> </a:t>
+            </a:r>
+            <a:r>
+              <a:rPr lang="de-DE" dirty="0" err="1"/>
+              <a:t>criteria</a:t>
+            </a:r>
+            <a:r>
+              <a:rPr lang="de-DE" dirty="0"/>
+              <a:t> </a:t>
+            </a:r>
+            <a:r>
+              <a:rPr lang="de-DE" dirty="0" err="1"/>
+              <a:t>required</a:t>
+            </a:r>
+            <a:r>
+              <a:rPr lang="de-DE" dirty="0"/>
+              <a:t>) and </a:t>
+            </a:r>
+            <a:r>
+              <a:rPr lang="de-DE" dirty="0" err="1"/>
+              <a:t>export</a:t>
+            </a:r>
+            <a:r>
+              <a:rPr lang="de-DE" dirty="0"/>
+              <a:t> </a:t>
+            </a:r>
+            <a:r>
+              <a:rPr lang="de-DE" dirty="0" err="1"/>
+              <a:t>classification</a:t>
+            </a:r>
+            <a:r>
+              <a:rPr lang="de-DE" dirty="0"/>
+              <a:t> back </a:t>
+            </a:r>
+            <a:r>
+              <a:rPr lang="de-DE" dirty="0" err="1"/>
+              <a:t>to</a:t>
+            </a:r>
+            <a:r>
+              <a:rPr lang="de-DE" dirty="0"/>
+              <a:t> </a:t>
+            </a:r>
+            <a:r>
+              <a:rPr lang="de-DE" dirty="0" err="1"/>
+              <a:t>HerediCare</a:t>
             </a:r>
             <a:endParaRPr lang="de-DE" dirty="0"/>
           </a:p>
@@ -6183,7 +6315,7 @@
           <p:nvPr>
             <p:extLst>
               <p:ext uri="{D42A27DB-BD31-4B8C-83A1-F6EECF244321}">
-                <p14:modId xmlns:p14="http://schemas.microsoft.com/office/powerpoint/2010/main" val="3689908726"/>
+                <p14:modId xmlns:p14="http://schemas.microsoft.com/office/powerpoint/2010/main" val="282203696"/>
               </p:ext>
             </p:extLst>
           </p:nvPr>
@@ -6420,87 +6552,6 @@
                     <a:p>
                       <a:r>
                         <a:rPr lang="de-DE" sz="700" dirty="0" err="1"/>
-                        <a:t>rsnum</a:t>
-                      </a:r>
-                      <a:endParaRPr lang="de-DE" sz="700" dirty="0"/>
-                    </a:p>
-                  </a:txBody>
-                  <a:tcPr>
-                    <a:lnL w="12700" cap="flat" cmpd="sng" algn="ctr">
-                      <a:solidFill>
-                        <a:schemeClr val="tx1"/>
-                      </a:solidFill>
-                      <a:prstDash val="solid"/>
-                      <a:round/>
-                      <a:headEnd type="none" w="med" len="med"/>
-                      <a:tailEnd type="none" w="med" len="med"/>
-                    </a:lnL>
-                    <a:lnR w="12700" cap="flat" cmpd="sng" algn="ctr">
-                      <a:solidFill>
-                        <a:schemeClr val="tx1"/>
-                      </a:solidFill>
-                      <a:prstDash val="solid"/>
-                      <a:round/>
-                      <a:headEnd type="none" w="med" len="med"/>
-                      <a:tailEnd type="none" w="med" len="med"/>
-                    </a:lnR>
-                  </a:tcPr>
-                </a:tc>
-                <a:tc>
-                  <a:txBody>
-                    <a:bodyPr/>
-                    <a:lstStyle/>
-                    <a:p>
-                      <a:r>
-                        <a:rPr lang="de-DE" sz="700" dirty="0" err="1"/>
-                        <a:t>text</a:t>
-                      </a:r>
-                      <a:r>
-                        <a:rPr lang="de-DE" sz="700" dirty="0"/>
-                        <a:t> </a:t>
-                      </a:r>
-                      <a:r>
-                        <a:rPr lang="de-DE" sz="700" b="1" i="1" dirty="0"/>
-                        <a:t>(n)</a:t>
-                      </a:r>
-                      <a:endParaRPr lang="de-DE" sz="700" dirty="0"/>
-                    </a:p>
-                  </a:txBody>
-                  <a:tcPr>
-                    <a:lnL w="12700" cap="flat" cmpd="sng" algn="ctr">
-                      <a:solidFill>
-                        <a:schemeClr val="tx1"/>
-                      </a:solidFill>
-                      <a:prstDash val="solid"/>
-                      <a:round/>
-                      <a:headEnd type="none" w="med" len="med"/>
-                      <a:tailEnd type="none" w="med" len="med"/>
-                    </a:lnL>
-                    <a:lnR w="12700" cap="flat" cmpd="sng" algn="ctr">
-                      <a:solidFill>
-                        <a:schemeClr val="tx1"/>
-                      </a:solidFill>
-                      <a:prstDash val="solid"/>
-                      <a:round/>
-                      <a:headEnd type="none" w="med" len="med"/>
-                      <a:tailEnd type="none" w="med" len="med"/>
-                    </a:lnR>
-                  </a:tcPr>
-                </a:tc>
-                <a:extLst>
-                  <a:ext uri="{0D108BD9-81ED-4DB2-BD59-A6C34878D82A}">
-                    <a16:rowId xmlns:a16="http://schemas.microsoft.com/office/drawing/2014/main" val="1304942092"/>
-                  </a:ext>
-                </a:extLst>
-              </a:tr>
-              <a:tr h="178635">
-                <a:tc>
-                  <a:txBody>
-                    <a:bodyPr/>
-                    <a:lstStyle/>
-                    <a:p>
-                      <a:r>
-                        <a:rPr lang="de-DE" sz="700" dirty="0" err="1"/>
                         <a:t>chr</a:t>
                       </a:r>
                       <a:endParaRPr lang="de-DE" sz="700" dirty="0"/>
@@ -6885,14 +6936,98 @@
                       <a:r>
                         <a:rPr lang="de-DE" sz="700" dirty="0" err="1">
                           <a:solidFill>
-                            <a:srgbClr val="FF0000"/>
+                            <a:schemeClr val="tx1"/>
                           </a:solidFill>
                         </a:rPr>
-                        <a:t>genotype</a:t>
+                        <a:t>error</a:t>
                       </a:r>
                       <a:endParaRPr lang="de-DE" sz="700" dirty="0">
                         <a:solidFill>
-                          <a:srgbClr val="FF0000"/>
+                          <a:schemeClr val="tx1"/>
+                        </a:solidFill>
+                      </a:endParaRPr>
+                    </a:p>
+                  </a:txBody>
+                  <a:tcPr>
+                    <a:lnL w="12700" cap="flat" cmpd="sng" algn="ctr">
+                      <a:solidFill>
+                        <a:schemeClr val="tx1"/>
+                      </a:solidFill>
+                      <a:prstDash val="solid"/>
+                      <a:round/>
+                      <a:headEnd type="none" w="med" len="med"/>
+                      <a:tailEnd type="none" w="med" len="med"/>
+                    </a:lnL>
+                    <a:lnR w="12700" cap="flat" cmpd="sng" algn="ctr">
+                      <a:solidFill>
+                        <a:schemeClr val="tx1"/>
+                      </a:solidFill>
+                      <a:prstDash val="solid"/>
+                      <a:round/>
+                      <a:headEnd type="none" w="med" len="med"/>
+                      <a:tailEnd type="none" w="med" len="med"/>
+                    </a:lnR>
+                  </a:tcPr>
+                </a:tc>
+                <a:tc>
+                  <a:txBody>
+                    <a:bodyPr/>
+                    <a:lstStyle/>
+                    <a:p>
+                      <a:r>
+                        <a:rPr lang="de-DE" sz="700" dirty="0">
+                          <a:solidFill>
+                            <a:schemeClr val="tx1"/>
+                          </a:solidFill>
+                        </a:rPr>
+                        <a:t>tinyint1</a:t>
+                      </a:r>
+                    </a:p>
+                  </a:txBody>
+                  <a:tcPr>
+                    <a:lnL w="12700" cap="flat" cmpd="sng" algn="ctr">
+                      <a:solidFill>
+                        <a:schemeClr val="tx1"/>
+                      </a:solidFill>
+                      <a:prstDash val="solid"/>
+                      <a:round/>
+                      <a:headEnd type="none" w="med" len="med"/>
+                      <a:tailEnd type="none" w="med" len="med"/>
+                    </a:lnL>
+                    <a:lnR w="12700" cap="flat" cmpd="sng" algn="ctr">
+                      <a:solidFill>
+                        <a:schemeClr val="tx1"/>
+                      </a:solidFill>
+                      <a:prstDash val="solid"/>
+                      <a:round/>
+                      <a:headEnd type="none" w="med" len="med"/>
+                      <a:tailEnd type="none" w="med" len="med"/>
+                    </a:lnR>
+                  </a:tcPr>
+                </a:tc>
+                <a:extLst>
+                  <a:ext uri="{0D108BD9-81ED-4DB2-BD59-A6C34878D82A}">
+                    <a16:rowId xmlns:a16="http://schemas.microsoft.com/office/drawing/2014/main" val="1576307755"/>
+                  </a:ext>
+                </a:extLst>
+              </a:tr>
+              <a:tr h="178635">
+                <a:tc>
+                  <a:txBody>
+                    <a:bodyPr/>
+                    <a:lstStyle/>
+                    <a:p>
+                      <a:r>
+                        <a:rPr lang="de-DE" sz="700" dirty="0" err="1">
+                          <a:solidFill>
+                            <a:schemeClr val="tx1"/>
+                          </a:solidFill>
+                        </a:rPr>
+                        <a:t>error_description</a:t>
+                      </a:r>
+                      <a:endParaRPr lang="de-DE" sz="700" dirty="0">
+                        <a:solidFill>
+                          <a:schemeClr val="tx1"/>
                         </a:solidFill>
                       </a:endParaRPr>
                     </a:p>
@@ -6935,16 +7070,27 @@
                       <a:r>
                         <a:rPr lang="de-DE" sz="700" dirty="0" err="1">
                           <a:solidFill>
-                            <a:srgbClr val="FF0000"/>
+                            <a:schemeClr val="tx1"/>
                           </a:solidFill>
                         </a:rPr>
-                        <a:t>enum</a:t>
+                        <a:t>text</a:t>
                       </a:r>
-                      <a:endParaRPr lang="de-DE" sz="700" dirty="0">
-                        <a:solidFill>
-                          <a:srgbClr val="FF0000"/>
-                        </a:solidFill>
-                      </a:endParaRPr>
+                      <a:r>
+                        <a:rPr lang="de-DE" sz="700" dirty="0">
+                          <a:solidFill>
+                            <a:schemeClr val="tx1"/>
+                          </a:solidFill>
+                        </a:rPr>
+                        <a:t> </a:t>
+                      </a:r>
+                      <a:r>
+                        <a:rPr lang="de-DE" sz="700" b="1" dirty="0">
+                          <a:solidFill>
+                            <a:schemeClr val="tx1"/>
+                          </a:solidFill>
+                        </a:rPr>
+                        <a:t>(n)</a:t>
+                      </a:r>
                     </a:p>
                   </a:txBody>
                   <a:tcPr>
@@ -6979,7 +7125,7 @@
                 </a:tc>
                 <a:extLst>
                   <a:ext uri="{0D108BD9-81ED-4DB2-BD59-A6C34878D82A}">
-                    <a16:rowId xmlns:a16="http://schemas.microsoft.com/office/drawing/2014/main" val="1576307755"/>
+                    <a16:rowId xmlns:a16="http://schemas.microsoft.com/office/drawing/2014/main" val="354561861"/>
                   </a:ext>
                 </a:extLst>
               </a:tr>
@@ -7665,7 +7811,7 @@
           <p:nvPr>
             <p:extLst>
               <p:ext uri="{D42A27DB-BD31-4B8C-83A1-F6EECF244321}">
-                <p14:modId xmlns:p14="http://schemas.microsoft.com/office/powerpoint/2010/main" val="2466750595"/>
+                <p14:modId xmlns:p14="http://schemas.microsoft.com/office/powerpoint/2010/main" val="799754619"/>
               </p:ext>
             </p:extLst>
           </p:nvPr>
@@ -7704,7 +7850,7 @@
                     <a:p>
                       <a:r>
                         <a:rPr lang="de-DE" sz="700" b="1" dirty="0" err="1"/>
-                        <a:t>variant_type</a:t>
+                        <a:t>annotation_type</a:t>
                       </a:r>
                       <a:endParaRPr lang="de-DE" sz="500" b="1" dirty="0"/>
                     </a:p>
@@ -8060,10 +8206,6 @@
                         <a:rPr lang="de-DE" sz="700" dirty="0" err="1"/>
                         <a:t>text</a:t>
                       </a:r>
-                      <a:r>
-                        <a:rPr lang="de-DE" sz="700" b="1" i="1" dirty="0"/>
-                        <a:t> (n)</a:t>
-                      </a:r>
                       <a:endParaRPr lang="de-DE" sz="700" dirty="0"/>
                     </a:p>
                   </a:txBody>
@@ -8115,9 +8257,10 @@
                     <a:lstStyle/>
                     <a:p>
                       <a:r>
-                        <a:rPr lang="de-DE" sz="700" dirty="0"/>
-                        <a:t>type</a:t>
+                        <a:rPr lang="de-DE" sz="700" dirty="0" err="1"/>
+                        <a:t>value_type</a:t>
                       </a:r>
+                      <a:endParaRPr lang="de-DE" sz="700" dirty="0"/>
                     </a:p>
                   </a:txBody>
                   <a:tcPr>
@@ -8237,13 +8380,18 @@
                     <a:lstStyle/>
                     <a:p>
                       <a:r>
-                        <a:rPr lang="de-DE" sz="700" dirty="0">
+                        <a:rPr lang="de-DE" sz="700" dirty="0" err="1">
                           <a:solidFill>
-                            <a:srgbClr val="FF0000"/>
+                            <a:schemeClr val="tx1"/>
                           </a:solidFill>
                         </a:rPr>
-                        <a:t>Source</a:t>
+                        <a:t>version</a:t>
                       </a:r>
+                      <a:endParaRPr lang="de-DE" sz="700" dirty="0">
+                        <a:solidFill>
+                          <a:schemeClr val="tx1"/>
+                        </a:solidFill>
+                      </a:endParaRPr>
                     </a:p>
                   </a:txBody>
                   <a:tcPr>
@@ -8289,13 +8437,18 @@
                     <a:lstStyle/>
                     <a:p>
                       <a:r>
-                        <a:rPr lang="de-DE" sz="700" dirty="0">
+                        <a:rPr lang="de-DE" sz="700" dirty="0" err="1">
                           <a:solidFill>
-                            <a:srgbClr val="FF0000"/>
+                            <a:schemeClr val="tx1"/>
                           </a:solidFill>
                         </a:rPr>
-                        <a:t>Text</a:t>
+                        <a:t>text</a:t>
                       </a:r>
+                      <a:endParaRPr lang="de-DE" sz="700" dirty="0">
+                        <a:solidFill>
+                          <a:schemeClr val="tx1"/>
+                        </a:solidFill>
+                      </a:endParaRPr>
                     </a:p>
                   </a:txBody>
                   <a:tcPr>
@@ -8337,7 +8490,7 @@
                 </a:tc>
                 <a:extLst>
                   <a:ext uri="{0D108BD9-81ED-4DB2-BD59-A6C34878D82A}">
-                    <a16:rowId xmlns:a16="http://schemas.microsoft.com/office/drawing/2014/main" val="2245360409"/>
+                    <a16:rowId xmlns:a16="http://schemas.microsoft.com/office/drawing/2014/main" val="1761718646"/>
                   </a:ext>
                 </a:extLst>
               </a:tr>
@@ -8360,7 +8513,7 @@
           <p:nvPr>
             <p:extLst>
               <p:ext uri="{D42A27DB-BD31-4B8C-83A1-F6EECF244321}">
-                <p14:modId xmlns:p14="http://schemas.microsoft.com/office/powerpoint/2010/main" val="2889954673"/>
+                <p14:modId xmlns:p14="http://schemas.microsoft.com/office/powerpoint/2010/main" val="1211914777"/>
               </p:ext>
             </p:extLst>
           </p:nvPr>
@@ -8605,7 +8758,7 @@
                     <a:p>
                       <a:r>
                         <a:rPr lang="de-DE" sz="700" dirty="0" err="1"/>
-                        <a:t>hgnc</a:t>
+                        <a:t>hgnc_id</a:t>
                       </a:r>
                       <a:endParaRPr lang="de-DE" sz="700" dirty="0"/>
                     </a:p>
@@ -8653,10 +8806,6 @@
                       <a:r>
                         <a:rPr lang="de-DE" sz="700" dirty="0" err="1"/>
                         <a:t>text</a:t>
-                      </a:r>
-                      <a:r>
-                        <a:rPr lang="de-DE" sz="700" b="1" i="1" dirty="0"/>
-                        <a:t> (n)</a:t>
                       </a:r>
                       <a:endParaRPr lang="de-DE" sz="700" dirty="0"/>
                     </a:p>
@@ -8710,7 +8859,7 @@
                     <a:p>
                       <a:r>
                         <a:rPr lang="de-DE" sz="700" dirty="0" err="1"/>
-                        <a:t>gene_symbol</a:t>
+                        <a:t>symbol</a:t>
                       </a:r>
                       <a:endParaRPr lang="de-DE" sz="700" dirty="0"/>
                     </a:p>
@@ -8758,10 +8907,6 @@
                       <a:r>
                         <a:rPr lang="de-DE" sz="700" dirty="0" err="1"/>
                         <a:t>text</a:t>
-                      </a:r>
-                      <a:r>
-                        <a:rPr lang="de-DE" sz="700" b="1" i="1" dirty="0"/>
-                        <a:t> (n)</a:t>
                       </a:r>
                       <a:endParaRPr lang="de-DE" sz="700" dirty="0"/>
                     </a:p>
@@ -8865,677 +9010,6 @@
                       <a:r>
                         <a:rPr lang="de-DE" sz="700" dirty="0" err="1"/>
                         <a:t>text</a:t>
-                      </a:r>
-                      <a:r>
-                        <a:rPr lang="de-DE" sz="700" b="1" i="1" dirty="0"/>
-                        <a:t> (n)</a:t>
-                      </a:r>
-                      <a:endParaRPr lang="de-DE" sz="700" dirty="0"/>
-                    </a:p>
-                  </a:txBody>
-                  <a:tcPr>
-                    <a:lnL w="12700" cap="flat" cmpd="sng" algn="ctr">
-                      <a:solidFill>
-                        <a:schemeClr val="tx1"/>
-                      </a:solidFill>
-                      <a:prstDash val="solid"/>
-                      <a:round/>
-                      <a:headEnd type="none" w="med" len="med"/>
-                      <a:tailEnd type="none" w="med" len="med"/>
-                    </a:lnL>
-                    <a:lnR w="12700" cap="flat" cmpd="sng" algn="ctr">
-                      <a:solidFill>
-                        <a:schemeClr val="tx1"/>
-                      </a:solidFill>
-                      <a:prstDash val="solid"/>
-                      <a:round/>
-                      <a:headEnd type="none" w="med" len="med"/>
-                      <a:tailEnd type="none" w="med" len="med"/>
-                    </a:lnR>
-                    <a:lnT w="12700" cap="flat" cmpd="sng" algn="ctr">
-                      <a:noFill/>
-                      <a:prstDash val="solid"/>
-                      <a:round/>
-                      <a:headEnd type="none" w="med" len="med"/>
-                      <a:tailEnd type="none" w="med" len="med"/>
-                    </a:lnT>
-                    <a:lnB w="12700" cap="flat" cmpd="sng" algn="ctr">
-                      <a:solidFill>
-                        <a:schemeClr val="tx1"/>
-                      </a:solidFill>
-                      <a:prstDash val="solid"/>
-                      <a:round/>
-                      <a:headEnd type="none" w="med" len="med"/>
-                      <a:tailEnd type="none" w="med" len="med"/>
-                    </a:lnB>
-                  </a:tcPr>
-                </a:tc>
-                <a:extLst>
-                  <a:ext uri="{0D108BD9-81ED-4DB2-BD59-A6C34878D82A}">
-                    <a16:rowId xmlns:a16="http://schemas.microsoft.com/office/drawing/2014/main" val="3968356380"/>
-                  </a:ext>
-                </a:extLst>
-              </a:tr>
-            </a:tbl>
-          </a:graphicData>
-        </a:graphic>
-      </p:graphicFrame>
-      <p:graphicFrame>
-        <p:nvGraphicFramePr>
-          <p:cNvPr id="9" name="Tabelle 8">
-            <a:extLst>
-              <a:ext uri="{FF2B5EF4-FFF2-40B4-BE49-F238E27FC236}">
-                <a16:creationId xmlns:a16="http://schemas.microsoft.com/office/drawing/2014/main" id="{0829249B-0C1F-4D29-9CCE-E64604663467}"/>
-              </a:ext>
-            </a:extLst>
-          </p:cNvPr>
-          <p:cNvGraphicFramePr>
-            <a:graphicFrameLocks noGrp="1"/>
-          </p:cNvGraphicFramePr>
-          <p:nvPr>
-            <p:extLst>
-              <p:ext uri="{D42A27DB-BD31-4B8C-83A1-F6EECF244321}">
-                <p14:modId xmlns:p14="http://schemas.microsoft.com/office/powerpoint/2010/main" val="509224442"/>
-              </p:ext>
-            </p:extLst>
-          </p:nvPr>
-        </p:nvGraphicFramePr>
-        <p:xfrm>
-          <a:off x="772719" y="5195404"/>
-          <a:ext cx="1407888" cy="1188720"/>
-        </p:xfrm>
-        <a:graphic>
-          <a:graphicData uri="http://schemas.openxmlformats.org/drawingml/2006/table">
-            <a:tbl>
-              <a:tblPr firstRow="1" bandRow="1">
-                <a:tableStyleId>{2D5ABB26-0587-4C30-8999-92F81FD0307C}</a:tableStyleId>
-              </a:tblPr>
-              <a:tblGrid>
-                <a:gridCol w="922696">
-                  <a:extLst>
-                    <a:ext uri="{9D8B030D-6E8A-4147-A177-3AD203B41FA5}">
-                      <a16:colId xmlns:a16="http://schemas.microsoft.com/office/drawing/2014/main" val="650321458"/>
-                    </a:ext>
-                  </a:extLst>
-                </a:gridCol>
-                <a:gridCol w="485192">
-                  <a:extLst>
-                    <a:ext uri="{9D8B030D-6E8A-4147-A177-3AD203B41FA5}">
-                      <a16:colId xmlns:a16="http://schemas.microsoft.com/office/drawing/2014/main" val="4065165498"/>
-                    </a:ext>
-                  </a:extLst>
-                </a:gridCol>
-              </a:tblGrid>
-              <a:tr h="178635">
-                <a:tc>
-                  <a:txBody>
-                    <a:bodyPr/>
-                    <a:lstStyle/>
-                    <a:p>
-                      <a:r>
-                        <a:rPr lang="de-DE" sz="700" b="1" dirty="0" err="1"/>
-                        <a:t>gene_annotation</a:t>
-                      </a:r>
-                      <a:endParaRPr lang="de-DE" sz="500" b="1" dirty="0"/>
-                    </a:p>
-                  </a:txBody>
-                  <a:tcPr>
-                    <a:lnL w="12700" cap="flat" cmpd="sng" algn="ctr">
-                      <a:solidFill>
-                        <a:schemeClr val="tx1"/>
-                      </a:solidFill>
-                      <a:prstDash val="solid"/>
-                      <a:round/>
-                      <a:headEnd type="none" w="med" len="med"/>
-                      <a:tailEnd type="none" w="med" len="med"/>
-                    </a:lnL>
-                    <a:lnR w="12700" cap="flat" cmpd="sng" algn="ctr">
-                      <a:noFill/>
-                      <a:prstDash val="solid"/>
-                      <a:round/>
-                      <a:headEnd type="none" w="med" len="med"/>
-                      <a:tailEnd type="none" w="med" len="med"/>
-                    </a:lnR>
-                    <a:lnT w="12700" cap="flat" cmpd="sng" algn="ctr">
-                      <a:solidFill>
-                        <a:schemeClr val="tx1"/>
-                      </a:solidFill>
-                      <a:prstDash val="solid"/>
-                      <a:round/>
-                      <a:headEnd type="none" w="med" len="med"/>
-                      <a:tailEnd type="none" w="med" len="med"/>
-                    </a:lnT>
-                    <a:lnB w="12700" cap="flat" cmpd="sng" algn="ctr">
-                      <a:solidFill>
-                        <a:schemeClr val="tx1"/>
-                      </a:solidFill>
-                      <a:prstDash val="solid"/>
-                      <a:round/>
-                      <a:headEnd type="none" w="med" len="med"/>
-                      <a:tailEnd type="none" w="med" len="med"/>
-                    </a:lnB>
-                  </a:tcPr>
-                </a:tc>
-                <a:tc>
-                  <a:txBody>
-                    <a:bodyPr/>
-                    <a:lstStyle/>
-                    <a:p>
-                      <a:endParaRPr lang="de-DE" sz="500" dirty="0"/>
-                    </a:p>
-                  </a:txBody>
-                  <a:tcPr>
-                    <a:lnL w="12700" cap="flat" cmpd="sng" algn="ctr">
-                      <a:noFill/>
-                      <a:prstDash val="solid"/>
-                      <a:round/>
-                      <a:headEnd type="none" w="med" len="med"/>
-                      <a:tailEnd type="none" w="med" len="med"/>
-                    </a:lnL>
-                    <a:lnR w="12700" cap="flat" cmpd="sng" algn="ctr">
-                      <a:solidFill>
-                        <a:schemeClr val="tx1"/>
-                      </a:solidFill>
-                      <a:prstDash val="solid"/>
-                      <a:round/>
-                      <a:headEnd type="none" w="med" len="med"/>
-                      <a:tailEnd type="none" w="med" len="med"/>
-                    </a:lnR>
-                    <a:lnT w="12700" cap="flat" cmpd="sng" algn="ctr">
-                      <a:solidFill>
-                        <a:schemeClr val="tx1"/>
-                      </a:solidFill>
-                      <a:prstDash val="solid"/>
-                      <a:round/>
-                      <a:headEnd type="none" w="med" len="med"/>
-                      <a:tailEnd type="none" w="med" len="med"/>
-                    </a:lnT>
-                    <a:lnB w="12700" cap="flat" cmpd="sng" algn="ctr">
-                      <a:solidFill>
-                        <a:schemeClr val="tx1"/>
-                      </a:solidFill>
-                      <a:prstDash val="solid"/>
-                      <a:round/>
-                      <a:headEnd type="none" w="med" len="med"/>
-                      <a:tailEnd type="none" w="med" len="med"/>
-                    </a:lnB>
-                  </a:tcPr>
-                </a:tc>
-                <a:extLst>
-                  <a:ext uri="{0D108BD9-81ED-4DB2-BD59-A6C34878D82A}">
-                    <a16:rowId xmlns:a16="http://schemas.microsoft.com/office/drawing/2014/main" val="109647893"/>
-                  </a:ext>
-                </a:extLst>
-              </a:tr>
-              <a:tr h="178635">
-                <a:tc>
-                  <a:txBody>
-                    <a:bodyPr/>
-                    <a:lstStyle/>
-                    <a:p>
-                      <a:r>
-                        <a:rPr lang="de-DE" sz="700" dirty="0" err="1"/>
-                        <a:t>id</a:t>
-                      </a:r>
-                      <a:endParaRPr lang="de-DE" sz="700" dirty="0"/>
-                    </a:p>
-                  </a:txBody>
-                  <a:tcPr>
-                    <a:lnL w="12700" cap="flat" cmpd="sng" algn="ctr">
-                      <a:solidFill>
-                        <a:schemeClr val="tx1"/>
-                      </a:solidFill>
-                      <a:prstDash val="solid"/>
-                      <a:round/>
-                      <a:headEnd type="none" w="med" len="med"/>
-                      <a:tailEnd type="none" w="med" len="med"/>
-                    </a:lnL>
-                    <a:lnR w="12700" cap="flat" cmpd="sng" algn="ctr">
-                      <a:solidFill>
-                        <a:schemeClr val="tx1"/>
-                      </a:solidFill>
-                      <a:prstDash val="solid"/>
-                      <a:round/>
-                      <a:headEnd type="none" w="med" len="med"/>
-                      <a:tailEnd type="none" w="med" len="med"/>
-                    </a:lnR>
-                    <a:lnT w="12700" cap="flat" cmpd="sng" algn="ctr">
-                      <a:solidFill>
-                        <a:schemeClr val="tx1"/>
-                      </a:solidFill>
-                      <a:prstDash val="solid"/>
-                      <a:round/>
-                      <a:headEnd type="none" w="med" len="med"/>
-                      <a:tailEnd type="none" w="med" len="med"/>
-                    </a:lnT>
-                    <a:lnB w="12700" cap="flat" cmpd="sng" algn="ctr">
-                      <a:noFill/>
-                      <a:prstDash val="solid"/>
-                      <a:round/>
-                      <a:headEnd type="none" w="med" len="med"/>
-                      <a:tailEnd type="none" w="med" len="med"/>
-                    </a:lnB>
-                  </a:tcPr>
-                </a:tc>
-                <a:tc>
-                  <a:txBody>
-                    <a:bodyPr/>
-                    <a:lstStyle/>
-                    <a:p>
-                      <a:r>
-                        <a:rPr lang="de-DE" sz="700" dirty="0" err="1"/>
-                        <a:t>int</a:t>
-                      </a:r>
-                      <a:endParaRPr lang="de-DE" sz="700" dirty="0"/>
-                    </a:p>
-                  </a:txBody>
-                  <a:tcPr>
-                    <a:lnL w="12700" cap="flat" cmpd="sng" algn="ctr">
-                      <a:solidFill>
-                        <a:schemeClr val="tx1"/>
-                      </a:solidFill>
-                      <a:prstDash val="solid"/>
-                      <a:round/>
-                      <a:headEnd type="none" w="med" len="med"/>
-                      <a:tailEnd type="none" w="med" len="med"/>
-                    </a:lnL>
-                    <a:lnR w="12700" cap="flat" cmpd="sng" algn="ctr">
-                      <a:solidFill>
-                        <a:schemeClr val="tx1"/>
-                      </a:solidFill>
-                      <a:prstDash val="solid"/>
-                      <a:round/>
-                      <a:headEnd type="none" w="med" len="med"/>
-                      <a:tailEnd type="none" w="med" len="med"/>
-                    </a:lnR>
-                    <a:lnT w="12700" cap="flat" cmpd="sng" algn="ctr">
-                      <a:solidFill>
-                        <a:schemeClr val="tx1"/>
-                      </a:solidFill>
-                      <a:prstDash val="solid"/>
-                      <a:round/>
-                      <a:headEnd type="none" w="med" len="med"/>
-                      <a:tailEnd type="none" w="med" len="med"/>
-                    </a:lnT>
-                    <a:lnB w="12700" cap="flat" cmpd="sng" algn="ctr">
-                      <a:noFill/>
-                      <a:prstDash val="solid"/>
-                      <a:round/>
-                      <a:headEnd type="none" w="med" len="med"/>
-                      <a:tailEnd type="none" w="med" len="med"/>
-                    </a:lnB>
-                  </a:tcPr>
-                </a:tc>
-                <a:extLst>
-                  <a:ext uri="{0D108BD9-81ED-4DB2-BD59-A6C34878D82A}">
-                    <a16:rowId xmlns:a16="http://schemas.microsoft.com/office/drawing/2014/main" val="312790266"/>
-                  </a:ext>
-                </a:extLst>
-              </a:tr>
-              <a:tr h="178635">
-                <a:tc>
-                  <a:txBody>
-                    <a:bodyPr/>
-                    <a:lstStyle/>
-                    <a:p>
-                      <a:r>
-                        <a:rPr lang="de-DE" sz="700" dirty="0" err="1"/>
-                        <a:t>gene_id</a:t>
-                      </a:r>
-                      <a:endParaRPr lang="de-DE" sz="700" dirty="0"/>
-                    </a:p>
-                  </a:txBody>
-                  <a:tcPr>
-                    <a:lnL w="12700" cap="flat" cmpd="sng" algn="ctr">
-                      <a:solidFill>
-                        <a:schemeClr val="tx1"/>
-                      </a:solidFill>
-                      <a:prstDash val="solid"/>
-                      <a:round/>
-                      <a:headEnd type="none" w="med" len="med"/>
-                      <a:tailEnd type="none" w="med" len="med"/>
-                    </a:lnL>
-                    <a:lnR w="12700" cap="flat" cmpd="sng" algn="ctr">
-                      <a:solidFill>
-                        <a:schemeClr val="tx1"/>
-                      </a:solidFill>
-                      <a:prstDash val="solid"/>
-                      <a:round/>
-                      <a:headEnd type="none" w="med" len="med"/>
-                      <a:tailEnd type="none" w="med" len="med"/>
-                    </a:lnR>
-                    <a:lnT w="12700" cap="flat" cmpd="sng" algn="ctr">
-                      <a:noFill/>
-                      <a:prstDash val="solid"/>
-                      <a:round/>
-                      <a:headEnd type="none" w="med" len="med"/>
-                      <a:tailEnd type="none" w="med" len="med"/>
-                    </a:lnT>
-                    <a:lnB w="12700" cap="flat" cmpd="sng" algn="ctr">
-                      <a:noFill/>
-                      <a:prstDash val="solid"/>
-                      <a:round/>
-                      <a:headEnd type="none" w="med" len="med"/>
-                      <a:tailEnd type="none" w="med" len="med"/>
-                    </a:lnB>
-                  </a:tcPr>
-                </a:tc>
-                <a:tc>
-                  <a:txBody>
-                    <a:bodyPr/>
-                    <a:lstStyle/>
-                    <a:p>
-                      <a:r>
-                        <a:rPr lang="de-DE" sz="700" dirty="0" err="1"/>
-                        <a:t>int</a:t>
-                      </a:r>
-                      <a:endParaRPr lang="de-DE" sz="700" dirty="0"/>
-                    </a:p>
-                  </a:txBody>
-                  <a:tcPr>
-                    <a:lnL w="12700" cap="flat" cmpd="sng" algn="ctr">
-                      <a:solidFill>
-                        <a:schemeClr val="tx1"/>
-                      </a:solidFill>
-                      <a:prstDash val="solid"/>
-                      <a:round/>
-                      <a:headEnd type="none" w="med" len="med"/>
-                      <a:tailEnd type="none" w="med" len="med"/>
-                    </a:lnL>
-                    <a:lnR w="12700" cap="flat" cmpd="sng" algn="ctr">
-                      <a:solidFill>
-                        <a:schemeClr val="tx1"/>
-                      </a:solidFill>
-                      <a:prstDash val="solid"/>
-                      <a:round/>
-                      <a:headEnd type="none" w="med" len="med"/>
-                      <a:tailEnd type="none" w="med" len="med"/>
-                    </a:lnR>
-                    <a:lnT w="12700" cap="flat" cmpd="sng" algn="ctr">
-                      <a:noFill/>
-                      <a:prstDash val="solid"/>
-                      <a:round/>
-                      <a:headEnd type="none" w="med" len="med"/>
-                      <a:tailEnd type="none" w="med" len="med"/>
-                    </a:lnT>
-                    <a:lnB w="12700" cap="flat" cmpd="sng" algn="ctr">
-                      <a:noFill/>
-                      <a:prstDash val="solid"/>
-                      <a:round/>
-                      <a:headEnd type="none" w="med" len="med"/>
-                      <a:tailEnd type="none" w="med" len="med"/>
-                    </a:lnB>
-                  </a:tcPr>
-                </a:tc>
-                <a:extLst>
-                  <a:ext uri="{0D108BD9-81ED-4DB2-BD59-A6C34878D82A}">
-                    <a16:rowId xmlns:a16="http://schemas.microsoft.com/office/drawing/2014/main" val="3560326657"/>
-                  </a:ext>
-                </a:extLst>
-              </a:tr>
-              <a:tr h="178635">
-                <a:tc>
-                  <a:txBody>
-                    <a:bodyPr/>
-                    <a:lstStyle/>
-                    <a:p>
-                      <a:r>
-                        <a:rPr lang="de-DE" sz="700" dirty="0" err="1"/>
-                        <a:t>annotation</a:t>
-                      </a:r>
-                      <a:endParaRPr lang="de-DE" sz="700" dirty="0"/>
-                    </a:p>
-                  </a:txBody>
-                  <a:tcPr>
-                    <a:lnL w="12700" cap="flat" cmpd="sng" algn="ctr">
-                      <a:solidFill>
-                        <a:schemeClr val="tx1"/>
-                      </a:solidFill>
-                      <a:prstDash val="solid"/>
-                      <a:round/>
-                      <a:headEnd type="none" w="med" len="med"/>
-                      <a:tailEnd type="none" w="med" len="med"/>
-                    </a:lnL>
-                    <a:lnR w="12700" cap="flat" cmpd="sng" algn="ctr">
-                      <a:solidFill>
-                        <a:schemeClr val="tx1"/>
-                      </a:solidFill>
-                      <a:prstDash val="solid"/>
-                      <a:round/>
-                      <a:headEnd type="none" w="med" len="med"/>
-                      <a:tailEnd type="none" w="med" len="med"/>
-                    </a:lnR>
-                    <a:lnT w="12700" cap="flat" cmpd="sng" algn="ctr">
-                      <a:noFill/>
-                      <a:prstDash val="solid"/>
-                      <a:round/>
-                      <a:headEnd type="none" w="med" len="med"/>
-                      <a:tailEnd type="none" w="med" len="med"/>
-                    </a:lnT>
-                    <a:lnB w="12700" cap="flat" cmpd="sng" algn="ctr">
-                      <a:noFill/>
-                      <a:prstDash val="solid"/>
-                      <a:round/>
-                      <a:headEnd type="none" w="med" len="med"/>
-                      <a:tailEnd type="none" w="med" len="med"/>
-                    </a:lnB>
-                  </a:tcPr>
-                </a:tc>
-                <a:tc>
-                  <a:txBody>
-                    <a:bodyPr/>
-                    <a:lstStyle/>
-                    <a:p>
-                      <a:r>
-                        <a:rPr lang="de-DE" sz="700" dirty="0" err="1"/>
-                        <a:t>text</a:t>
-                      </a:r>
-                      <a:endParaRPr lang="de-DE" sz="700" dirty="0"/>
-                    </a:p>
-                  </a:txBody>
-                  <a:tcPr>
-                    <a:lnL w="12700" cap="flat" cmpd="sng" algn="ctr">
-                      <a:solidFill>
-                        <a:schemeClr val="tx1"/>
-                      </a:solidFill>
-                      <a:prstDash val="solid"/>
-                      <a:round/>
-                      <a:headEnd type="none" w="med" len="med"/>
-                      <a:tailEnd type="none" w="med" len="med"/>
-                    </a:lnL>
-                    <a:lnR w="12700" cap="flat" cmpd="sng" algn="ctr">
-                      <a:solidFill>
-                        <a:schemeClr val="tx1"/>
-                      </a:solidFill>
-                      <a:prstDash val="solid"/>
-                      <a:round/>
-                      <a:headEnd type="none" w="med" len="med"/>
-                      <a:tailEnd type="none" w="med" len="med"/>
-                    </a:lnR>
-                    <a:lnT w="12700" cap="flat" cmpd="sng" algn="ctr">
-                      <a:noFill/>
-                      <a:prstDash val="solid"/>
-                      <a:round/>
-                      <a:headEnd type="none" w="med" len="med"/>
-                      <a:tailEnd type="none" w="med" len="med"/>
-                    </a:lnT>
-                    <a:lnB w="12700" cap="flat" cmpd="sng" algn="ctr">
-                      <a:noFill/>
-                      <a:prstDash val="solid"/>
-                      <a:round/>
-                      <a:headEnd type="none" w="med" len="med"/>
-                      <a:tailEnd type="none" w="med" len="med"/>
-                    </a:lnB>
-                  </a:tcPr>
-                </a:tc>
-                <a:extLst>
-                  <a:ext uri="{0D108BD9-81ED-4DB2-BD59-A6C34878D82A}">
-                    <a16:rowId xmlns:a16="http://schemas.microsoft.com/office/drawing/2014/main" val="1682664123"/>
-                  </a:ext>
-                </a:extLst>
-              </a:tr>
-              <a:tr h="178635">
-                <a:tc>
-                  <a:txBody>
-                    <a:bodyPr/>
-                    <a:lstStyle/>
-                    <a:p>
-                      <a:r>
-                        <a:rPr lang="de-DE" sz="700" dirty="0"/>
-                        <a:t>source</a:t>
-                      </a:r>
-                    </a:p>
-                  </a:txBody>
-                  <a:tcPr>
-                    <a:lnL w="12700" cap="flat" cmpd="sng" algn="ctr">
-                      <a:solidFill>
-                        <a:schemeClr val="tx1"/>
-                      </a:solidFill>
-                      <a:prstDash val="solid"/>
-                      <a:round/>
-                      <a:headEnd type="none" w="med" len="med"/>
-                      <a:tailEnd type="none" w="med" len="med"/>
-                    </a:lnL>
-                    <a:lnR w="12700" cap="flat" cmpd="sng" algn="ctr">
-                      <a:solidFill>
-                        <a:schemeClr val="tx1"/>
-                      </a:solidFill>
-                      <a:prstDash val="solid"/>
-                      <a:round/>
-                      <a:headEnd type="none" w="med" len="med"/>
-                      <a:tailEnd type="none" w="med" len="med"/>
-                    </a:lnR>
-                    <a:lnT w="12700" cap="flat" cmpd="sng" algn="ctr">
-                      <a:noFill/>
-                      <a:prstDash val="solid"/>
-                      <a:round/>
-                      <a:headEnd type="none" w="med" len="med"/>
-                      <a:tailEnd type="none" w="med" len="med"/>
-                    </a:lnT>
-                    <a:lnB w="12700" cap="flat" cmpd="sng" algn="ctr">
-                      <a:noFill/>
-                      <a:prstDash val="solid"/>
-                      <a:round/>
-                      <a:headEnd type="none" w="med" len="med"/>
-                      <a:tailEnd type="none" w="med" len="med"/>
-                    </a:lnB>
-                  </a:tcPr>
-                </a:tc>
-                <a:tc>
-                  <a:txBody>
-                    <a:bodyPr/>
-                    <a:lstStyle/>
-                    <a:p>
-                      <a:r>
-                        <a:rPr lang="de-DE" sz="700" dirty="0" err="1"/>
-                        <a:t>text</a:t>
-                      </a:r>
-                      <a:endParaRPr lang="de-DE" sz="700" dirty="0"/>
-                    </a:p>
-                  </a:txBody>
-                  <a:tcPr>
-                    <a:lnL w="12700" cap="flat" cmpd="sng" algn="ctr">
-                      <a:solidFill>
-                        <a:schemeClr val="tx1"/>
-                      </a:solidFill>
-                      <a:prstDash val="solid"/>
-                      <a:round/>
-                      <a:headEnd type="none" w="med" len="med"/>
-                      <a:tailEnd type="none" w="med" len="med"/>
-                    </a:lnL>
-                    <a:lnR w="12700" cap="flat" cmpd="sng" algn="ctr">
-                      <a:solidFill>
-                        <a:schemeClr val="tx1"/>
-                      </a:solidFill>
-                      <a:prstDash val="solid"/>
-                      <a:round/>
-                      <a:headEnd type="none" w="med" len="med"/>
-                      <a:tailEnd type="none" w="med" len="med"/>
-                    </a:lnR>
-                    <a:lnT w="12700" cap="flat" cmpd="sng" algn="ctr">
-                      <a:noFill/>
-                      <a:prstDash val="solid"/>
-                      <a:round/>
-                      <a:headEnd type="none" w="med" len="med"/>
-                      <a:tailEnd type="none" w="med" len="med"/>
-                    </a:lnT>
-                    <a:lnB w="12700" cap="flat" cmpd="sng" algn="ctr">
-                      <a:noFill/>
-                      <a:prstDash val="solid"/>
-                      <a:round/>
-                      <a:headEnd type="none" w="med" len="med"/>
-                      <a:tailEnd type="none" w="med" len="med"/>
-                    </a:lnB>
-                  </a:tcPr>
-                </a:tc>
-                <a:extLst>
-                  <a:ext uri="{0D108BD9-81ED-4DB2-BD59-A6C34878D82A}">
-                    <a16:rowId xmlns:a16="http://schemas.microsoft.com/office/drawing/2014/main" val="3885326720"/>
-                  </a:ext>
-                </a:extLst>
-              </a:tr>
-              <a:tr h="178635">
-                <a:tc>
-                  <a:txBody>
-                    <a:bodyPr/>
-                    <a:lstStyle/>
-                    <a:p>
-                      <a:r>
-                        <a:rPr lang="de-DE" sz="700" dirty="0" err="1"/>
-                        <a:t>description</a:t>
-                      </a:r>
-                      <a:endParaRPr lang="de-DE" sz="700" dirty="0"/>
-                    </a:p>
-                  </a:txBody>
-                  <a:tcPr>
-                    <a:lnL w="12700" cap="flat" cmpd="sng" algn="ctr">
-                      <a:solidFill>
-                        <a:schemeClr val="tx1"/>
-                      </a:solidFill>
-                      <a:prstDash val="solid"/>
-                      <a:round/>
-                      <a:headEnd type="none" w="med" len="med"/>
-                      <a:tailEnd type="none" w="med" len="med"/>
-                    </a:lnL>
-                    <a:lnR w="12700" cap="flat" cmpd="sng" algn="ctr">
-                      <a:solidFill>
-                        <a:schemeClr val="tx1"/>
-                      </a:solidFill>
-                      <a:prstDash val="solid"/>
-                      <a:round/>
-                      <a:headEnd type="none" w="med" len="med"/>
-                      <a:tailEnd type="none" w="med" len="med"/>
-                    </a:lnR>
-                    <a:lnT w="12700" cap="flat" cmpd="sng" algn="ctr">
-                      <a:noFill/>
-                      <a:prstDash val="solid"/>
-                      <a:round/>
-                      <a:headEnd type="none" w="med" len="med"/>
-                      <a:tailEnd type="none" w="med" len="med"/>
-                    </a:lnT>
-                    <a:lnB w="12700" cap="flat" cmpd="sng" algn="ctr">
-                      <a:solidFill>
-                        <a:schemeClr val="tx1"/>
-                      </a:solidFill>
-                      <a:prstDash val="solid"/>
-                      <a:round/>
-                      <a:headEnd type="none" w="med" len="med"/>
-                      <a:tailEnd type="none" w="med" len="med"/>
-                    </a:lnB>
-                  </a:tcPr>
-                </a:tc>
-                <a:tc>
-                  <a:txBody>
-                    <a:bodyPr/>
-                    <a:lstStyle/>
-                    <a:p>
-                      <a:r>
-                        <a:rPr lang="de-DE" sz="700" dirty="0" err="1"/>
-                        <a:t>text</a:t>
-                      </a:r>
-                      <a:r>
-                        <a:rPr lang="de-DE" sz="700" b="1" i="1" dirty="0"/>
-                        <a:t> (n)</a:t>
                       </a:r>
                       <a:endParaRPr lang="de-DE" sz="700" dirty="0"/>
                     </a:p>
@@ -9603,12 +9077,12 @@
         </p:nvCxnSpPr>
         <p:spPr>
           <a:xfrm>
-            <a:off x="4017538" y="1599799"/>
-            <a:ext cx="1649514" cy="1535093"/>
+            <a:off x="3922262" y="1443135"/>
+            <a:ext cx="1744790" cy="1691757"/>
           </a:xfrm>
           <a:prstGeom prst="bentConnector3">
             <a:avLst>
-              <a:gd name="adj1" fmla="val 73362"/>
+              <a:gd name="adj1" fmla="val 74599"/>
             </a:avLst>
           </a:prstGeom>
           <a:ln w="25400">
@@ -9647,8 +9121,8 @@
         </p:nvGrpSpPr>
         <p:grpSpPr>
           <a:xfrm>
-            <a:off x="4413674" y="1723655"/>
-            <a:ext cx="160799" cy="916545"/>
+            <a:off x="4413674" y="1648409"/>
+            <a:ext cx="160799" cy="991792"/>
             <a:chOff x="6742921" y="2255985"/>
             <a:chExt cx="160799" cy="916545"/>
           </a:xfrm>
@@ -9743,116 +9217,6 @@
           </p:style>
         </p:cxnSp>
       </p:grpSp>
-      <p:grpSp>
-        <p:nvGrpSpPr>
-          <p:cNvPr id="65" name="Gruppieren 64">
-            <a:extLst>
-              <a:ext uri="{FF2B5EF4-FFF2-40B4-BE49-F238E27FC236}">
-                <a16:creationId xmlns:a16="http://schemas.microsoft.com/office/drawing/2014/main" id="{EEDF1258-2AE2-4EF9-9DBD-7EC6A9FDA544}"/>
-              </a:ext>
-            </a:extLst>
-          </p:cNvPr>
-          <p:cNvGrpSpPr/>
-          <p:nvPr/>
-        </p:nvGrpSpPr>
-        <p:grpSpPr>
-          <a:xfrm flipH="1" flipV="1">
-            <a:off x="529068" y="4318032"/>
-            <a:ext cx="247416" cy="1402081"/>
-            <a:chOff x="6730186" y="2255985"/>
-            <a:chExt cx="160799" cy="916545"/>
-          </a:xfrm>
-        </p:grpSpPr>
-        <p:cxnSp>
-          <p:nvCxnSpPr>
-            <p:cNvPr id="66" name="Verbinder: gewinkelt 65">
-              <a:extLst>
-                <a:ext uri="{FF2B5EF4-FFF2-40B4-BE49-F238E27FC236}">
-                  <a16:creationId xmlns:a16="http://schemas.microsoft.com/office/drawing/2014/main" id="{964FC879-050A-465D-84E4-66E388FCDD1F}"/>
-                </a:ext>
-              </a:extLst>
-            </p:cNvPr>
-            <p:cNvCxnSpPr>
-              <a:cxnSpLocks/>
-            </p:cNvCxnSpPr>
-            <p:nvPr/>
-          </p:nvCxnSpPr>
-          <p:spPr>
-            <a:xfrm rot="16200000" flipH="1">
-              <a:off x="6361553" y="2643425"/>
-              <a:ext cx="916545" cy="141666"/>
-            </a:xfrm>
-            <a:prstGeom prst="bentConnector3">
-              <a:avLst>
-                <a:gd name="adj1" fmla="val 117"/>
-              </a:avLst>
-            </a:prstGeom>
-            <a:ln w="25400">
-              <a:solidFill>
-                <a:schemeClr val="tx1"/>
-              </a:solidFill>
-            </a:ln>
-          </p:spPr>
-          <p:style>
-            <a:lnRef idx="1">
-              <a:schemeClr val="accent1"/>
-            </a:lnRef>
-            <a:fillRef idx="0">
-              <a:schemeClr val="accent1"/>
-            </a:fillRef>
-            <a:effectRef idx="0">
-              <a:schemeClr val="accent1"/>
-            </a:effectRef>
-            <a:fontRef idx="minor">
-              <a:schemeClr val="tx1"/>
-            </a:fontRef>
-          </p:style>
-        </p:cxnSp>
-        <p:cxnSp>
-          <p:nvCxnSpPr>
-            <p:cNvPr id="67" name="Gerade Verbindung mit Pfeil 66">
-              <a:extLst>
-                <a:ext uri="{FF2B5EF4-FFF2-40B4-BE49-F238E27FC236}">
-                  <a16:creationId xmlns:a16="http://schemas.microsoft.com/office/drawing/2014/main" id="{8FCB3BE4-586E-49B1-A402-CF8F0AE107BB}"/>
-                </a:ext>
-              </a:extLst>
-            </p:cNvPr>
-            <p:cNvCxnSpPr>
-              <a:cxnSpLocks/>
-            </p:cNvCxnSpPr>
-            <p:nvPr/>
-          </p:nvCxnSpPr>
-          <p:spPr>
-            <a:xfrm flipH="1">
-              <a:off x="6730186" y="3165413"/>
-              <a:ext cx="160799" cy="0"/>
-            </a:xfrm>
-            <a:prstGeom prst="straightConnector1">
-              <a:avLst/>
-            </a:prstGeom>
-            <a:ln w="25400">
-              <a:solidFill>
-                <a:schemeClr val="tx1"/>
-              </a:solidFill>
-              <a:tailEnd type="triangle"/>
-            </a:ln>
-          </p:spPr>
-          <p:style>
-            <a:lnRef idx="1">
-              <a:schemeClr val="accent1"/>
-            </a:lnRef>
-            <a:fillRef idx="0">
-              <a:schemeClr val="accent1"/>
-            </a:fillRef>
-            <a:effectRef idx="0">
-              <a:schemeClr val="accent1"/>
-            </a:effectRef>
-            <a:fontRef idx="minor">
-              <a:schemeClr val="tx1"/>
-            </a:fontRef>
-          </p:style>
-        </p:cxnSp>
-      </p:grpSp>
       <p:cxnSp>
         <p:nvCxnSpPr>
           <p:cNvPr id="68" name="Verbinder: gewinkelt 67">
@@ -9913,7 +9277,7 @@
         </p:nvSpPr>
         <p:spPr>
           <a:xfrm>
-            <a:off x="1675120" y="101997"/>
+            <a:off x="113798" y="70895"/>
             <a:ext cx="2568652" cy="523220"/>
           </a:xfrm>
           <a:prstGeom prst="rect">
@@ -9934,674 +9298,6 @@
           </a:p>
         </p:txBody>
       </p:sp>
-      <p:graphicFrame>
-        <p:nvGraphicFramePr>
-          <p:cNvPr id="83" name="Tabelle 82">
-            <a:extLst>
-              <a:ext uri="{FF2B5EF4-FFF2-40B4-BE49-F238E27FC236}">
-                <a16:creationId xmlns:a16="http://schemas.microsoft.com/office/drawing/2014/main" id="{A2FE7587-571A-40B4-BF85-DFC49242A192}"/>
-              </a:ext>
-            </a:extLst>
-          </p:cNvPr>
-          <p:cNvGraphicFramePr>
-            <a:graphicFrameLocks noGrp="1"/>
-          </p:cNvGraphicFramePr>
-          <p:nvPr>
-            <p:extLst>
-              <p:ext uri="{D42A27DB-BD31-4B8C-83A1-F6EECF244321}">
-                <p14:modId xmlns:p14="http://schemas.microsoft.com/office/powerpoint/2010/main" val="3383731055"/>
-              </p:ext>
-            </p:extLst>
-          </p:nvPr>
-        </p:nvGraphicFramePr>
-        <p:xfrm>
-          <a:off x="747547" y="1049831"/>
-          <a:ext cx="1407888" cy="1402080"/>
-        </p:xfrm>
-        <a:graphic>
-          <a:graphicData uri="http://schemas.openxmlformats.org/drawingml/2006/table">
-            <a:tbl>
-              <a:tblPr firstRow="1" bandRow="1">
-                <a:tableStyleId>{2D5ABB26-0587-4C30-8999-92F81FD0307C}</a:tableStyleId>
-              </a:tblPr>
-              <a:tblGrid>
-                <a:gridCol w="922696">
-                  <a:extLst>
-                    <a:ext uri="{9D8B030D-6E8A-4147-A177-3AD203B41FA5}">
-                      <a16:colId xmlns:a16="http://schemas.microsoft.com/office/drawing/2014/main" val="650321458"/>
-                    </a:ext>
-                  </a:extLst>
-                </a:gridCol>
-                <a:gridCol w="485192">
-                  <a:extLst>
-                    <a:ext uri="{9D8B030D-6E8A-4147-A177-3AD203B41FA5}">
-                      <a16:colId xmlns:a16="http://schemas.microsoft.com/office/drawing/2014/main" val="4065165498"/>
-                    </a:ext>
-                  </a:extLst>
-                </a:gridCol>
-              </a:tblGrid>
-              <a:tr h="178635">
-                <a:tc gridSpan="2">
-                  <a:txBody>
-                    <a:bodyPr/>
-                    <a:lstStyle/>
-                    <a:p>
-                      <a:r>
-                        <a:rPr lang="de-DE" sz="700" b="1" dirty="0" err="1"/>
-                        <a:t>supplementary_documents</a:t>
-                      </a:r>
-                      <a:endParaRPr lang="de-DE" sz="500" b="1" dirty="0"/>
-                    </a:p>
-                  </a:txBody>
-                  <a:tcPr>
-                    <a:lnL w="12700" cap="flat" cmpd="sng" algn="ctr">
-                      <a:solidFill>
-                        <a:schemeClr val="tx1"/>
-                      </a:solidFill>
-                      <a:prstDash val="solid"/>
-                      <a:round/>
-                      <a:headEnd type="none" w="med" len="med"/>
-                      <a:tailEnd type="none" w="med" len="med"/>
-                    </a:lnL>
-                    <a:lnR w="12700" cap="flat" cmpd="sng" algn="ctr">
-                      <a:solidFill>
-                        <a:schemeClr val="tx1"/>
-                      </a:solidFill>
-                      <a:prstDash val="solid"/>
-                      <a:round/>
-                      <a:headEnd type="none" w="med" len="med"/>
-                      <a:tailEnd type="none" w="med" len="med"/>
-                    </a:lnR>
-                    <a:lnT w="12700" cap="flat" cmpd="sng" algn="ctr">
-                      <a:solidFill>
-                        <a:schemeClr val="tx1"/>
-                      </a:solidFill>
-                      <a:prstDash val="solid"/>
-                      <a:round/>
-                      <a:headEnd type="none" w="med" len="med"/>
-                      <a:tailEnd type="none" w="med" len="med"/>
-                    </a:lnT>
-                    <a:lnB w="12700" cap="flat" cmpd="sng" algn="ctr">
-                      <a:solidFill>
-                        <a:schemeClr val="tx1"/>
-                      </a:solidFill>
-                      <a:prstDash val="solid"/>
-                      <a:round/>
-                      <a:headEnd type="none" w="med" len="med"/>
-                      <a:tailEnd type="none" w="med" len="med"/>
-                    </a:lnB>
-                  </a:tcPr>
-                </a:tc>
-                <a:tc hMerge="1">
-                  <a:txBody>
-                    <a:bodyPr/>
-                    <a:lstStyle/>
-                    <a:p>
-                      <a:endParaRPr lang="de-DE" sz="500" dirty="0"/>
-                    </a:p>
-                  </a:txBody>
-                  <a:tcPr>
-                    <a:lnL w="12700" cap="flat" cmpd="sng" algn="ctr">
-                      <a:noFill/>
-                      <a:prstDash val="solid"/>
-                      <a:round/>
-                      <a:headEnd type="none" w="med" len="med"/>
-                      <a:tailEnd type="none" w="med" len="med"/>
-                    </a:lnL>
-                    <a:lnR w="12700" cap="flat" cmpd="sng" algn="ctr">
-                      <a:solidFill>
-                        <a:schemeClr val="tx1"/>
-                      </a:solidFill>
-                      <a:prstDash val="solid"/>
-                      <a:round/>
-                      <a:headEnd type="none" w="med" len="med"/>
-                      <a:tailEnd type="none" w="med" len="med"/>
-                    </a:lnR>
-                    <a:lnT w="12700" cap="flat" cmpd="sng" algn="ctr">
-                      <a:solidFill>
-                        <a:schemeClr val="tx1"/>
-                      </a:solidFill>
-                      <a:prstDash val="solid"/>
-                      <a:round/>
-                      <a:headEnd type="none" w="med" len="med"/>
-                      <a:tailEnd type="none" w="med" len="med"/>
-                    </a:lnT>
-                    <a:lnB w="12700" cap="flat" cmpd="sng" algn="ctr">
-                      <a:solidFill>
-                        <a:schemeClr val="tx1"/>
-                      </a:solidFill>
-                      <a:prstDash val="solid"/>
-                      <a:round/>
-                      <a:headEnd type="none" w="med" len="med"/>
-                      <a:tailEnd type="none" w="med" len="med"/>
-                    </a:lnB>
-                  </a:tcPr>
-                </a:tc>
-                <a:extLst>
-                  <a:ext uri="{0D108BD9-81ED-4DB2-BD59-A6C34878D82A}">
-                    <a16:rowId xmlns:a16="http://schemas.microsoft.com/office/drawing/2014/main" val="109647893"/>
-                  </a:ext>
-                </a:extLst>
-              </a:tr>
-              <a:tr h="178635">
-                <a:tc>
-                  <a:txBody>
-                    <a:bodyPr/>
-                    <a:lstStyle/>
-                    <a:p>
-                      <a:r>
-                        <a:rPr lang="de-DE" sz="700" dirty="0" err="1"/>
-                        <a:t>id</a:t>
-                      </a:r>
-                      <a:endParaRPr lang="de-DE" sz="700" dirty="0"/>
-                    </a:p>
-                  </a:txBody>
-                  <a:tcPr>
-                    <a:lnL w="12700" cap="flat" cmpd="sng" algn="ctr">
-                      <a:solidFill>
-                        <a:schemeClr val="tx1"/>
-                      </a:solidFill>
-                      <a:prstDash val="solid"/>
-                      <a:round/>
-                      <a:headEnd type="none" w="med" len="med"/>
-                      <a:tailEnd type="none" w="med" len="med"/>
-                    </a:lnL>
-                    <a:lnR w="12700" cap="flat" cmpd="sng" algn="ctr">
-                      <a:solidFill>
-                        <a:schemeClr val="tx1"/>
-                      </a:solidFill>
-                      <a:prstDash val="solid"/>
-                      <a:round/>
-                      <a:headEnd type="none" w="med" len="med"/>
-                      <a:tailEnd type="none" w="med" len="med"/>
-                    </a:lnR>
-                    <a:lnT w="12700" cap="flat" cmpd="sng" algn="ctr">
-                      <a:solidFill>
-                        <a:schemeClr val="tx1"/>
-                      </a:solidFill>
-                      <a:prstDash val="solid"/>
-                      <a:round/>
-                      <a:headEnd type="none" w="med" len="med"/>
-                      <a:tailEnd type="none" w="med" len="med"/>
-                    </a:lnT>
-                    <a:lnB w="12700" cap="flat" cmpd="sng" algn="ctr">
-                      <a:noFill/>
-                      <a:prstDash val="solid"/>
-                      <a:round/>
-                      <a:headEnd type="none" w="med" len="med"/>
-                      <a:tailEnd type="none" w="med" len="med"/>
-                    </a:lnB>
-                  </a:tcPr>
-                </a:tc>
-                <a:tc>
-                  <a:txBody>
-                    <a:bodyPr/>
-                    <a:lstStyle/>
-                    <a:p>
-                      <a:r>
-                        <a:rPr lang="de-DE" sz="700" dirty="0" err="1"/>
-                        <a:t>int</a:t>
-                      </a:r>
-                      <a:endParaRPr lang="de-DE" sz="700" dirty="0"/>
-                    </a:p>
-                  </a:txBody>
-                  <a:tcPr>
-                    <a:lnL w="12700" cap="flat" cmpd="sng" algn="ctr">
-                      <a:solidFill>
-                        <a:schemeClr val="tx1"/>
-                      </a:solidFill>
-                      <a:prstDash val="solid"/>
-                      <a:round/>
-                      <a:headEnd type="none" w="med" len="med"/>
-                      <a:tailEnd type="none" w="med" len="med"/>
-                    </a:lnL>
-                    <a:lnR w="12700" cap="flat" cmpd="sng" algn="ctr">
-                      <a:solidFill>
-                        <a:schemeClr val="tx1"/>
-                      </a:solidFill>
-                      <a:prstDash val="solid"/>
-                      <a:round/>
-                      <a:headEnd type="none" w="med" len="med"/>
-                      <a:tailEnd type="none" w="med" len="med"/>
-                    </a:lnR>
-                    <a:lnT w="12700" cap="flat" cmpd="sng" algn="ctr">
-                      <a:solidFill>
-                        <a:schemeClr val="tx1"/>
-                      </a:solidFill>
-                      <a:prstDash val="solid"/>
-                      <a:round/>
-                      <a:headEnd type="none" w="med" len="med"/>
-                      <a:tailEnd type="none" w="med" len="med"/>
-                    </a:lnT>
-                    <a:lnB w="12700" cap="flat" cmpd="sng" algn="ctr">
-                      <a:noFill/>
-                      <a:prstDash val="solid"/>
-                      <a:round/>
-                      <a:headEnd type="none" w="med" len="med"/>
-                      <a:tailEnd type="none" w="med" len="med"/>
-                    </a:lnB>
-                  </a:tcPr>
-                </a:tc>
-                <a:extLst>
-                  <a:ext uri="{0D108BD9-81ED-4DB2-BD59-A6C34878D82A}">
-                    <a16:rowId xmlns:a16="http://schemas.microsoft.com/office/drawing/2014/main" val="3560326657"/>
-                  </a:ext>
-                </a:extLst>
-              </a:tr>
-              <a:tr h="178635">
-                <a:tc>
-                  <a:txBody>
-                    <a:bodyPr/>
-                    <a:lstStyle/>
-                    <a:p>
-                      <a:r>
-                        <a:rPr lang="de-DE" sz="700" dirty="0" err="1"/>
-                        <a:t>table_name</a:t>
-                      </a:r>
-                      <a:endParaRPr lang="de-DE" sz="700" dirty="0"/>
-                    </a:p>
-                  </a:txBody>
-                  <a:tcPr>
-                    <a:lnL w="12700" cap="flat" cmpd="sng" algn="ctr">
-                      <a:solidFill>
-                        <a:schemeClr val="tx1"/>
-                      </a:solidFill>
-                      <a:prstDash val="solid"/>
-                      <a:round/>
-                      <a:headEnd type="none" w="med" len="med"/>
-                      <a:tailEnd type="none" w="med" len="med"/>
-                    </a:lnL>
-                    <a:lnR w="12700" cap="flat" cmpd="sng" algn="ctr">
-                      <a:solidFill>
-                        <a:schemeClr val="tx1"/>
-                      </a:solidFill>
-                      <a:prstDash val="solid"/>
-                      <a:round/>
-                      <a:headEnd type="none" w="med" len="med"/>
-                      <a:tailEnd type="none" w="med" len="med"/>
-                    </a:lnR>
-                    <a:lnT w="12700" cap="flat" cmpd="sng" algn="ctr">
-                      <a:noFill/>
-                      <a:prstDash val="solid"/>
-                      <a:round/>
-                      <a:headEnd type="none" w="med" len="med"/>
-                      <a:tailEnd type="none" w="med" len="med"/>
-                    </a:lnT>
-                    <a:lnB w="12700" cap="flat" cmpd="sng" algn="ctr">
-                      <a:noFill/>
-                      <a:prstDash val="solid"/>
-                      <a:round/>
-                      <a:headEnd type="none" w="med" len="med"/>
-                      <a:tailEnd type="none" w="med" len="med"/>
-                    </a:lnB>
-                  </a:tcPr>
-                </a:tc>
-                <a:tc>
-                  <a:txBody>
-                    <a:bodyPr/>
-                    <a:lstStyle/>
-                    <a:p>
-                      <a:r>
-                        <a:rPr lang="de-DE" sz="700" dirty="0" err="1"/>
-                        <a:t>text</a:t>
-                      </a:r>
-                      <a:endParaRPr lang="de-DE" sz="700" dirty="0"/>
-                    </a:p>
-                  </a:txBody>
-                  <a:tcPr>
-                    <a:lnL w="12700" cap="flat" cmpd="sng" algn="ctr">
-                      <a:solidFill>
-                        <a:schemeClr val="tx1"/>
-                      </a:solidFill>
-                      <a:prstDash val="solid"/>
-                      <a:round/>
-                      <a:headEnd type="none" w="med" len="med"/>
-                      <a:tailEnd type="none" w="med" len="med"/>
-                    </a:lnL>
-                    <a:lnR w="12700" cap="flat" cmpd="sng" algn="ctr">
-                      <a:solidFill>
-                        <a:schemeClr val="tx1"/>
-                      </a:solidFill>
-                      <a:prstDash val="solid"/>
-                      <a:round/>
-                      <a:headEnd type="none" w="med" len="med"/>
-                      <a:tailEnd type="none" w="med" len="med"/>
-                    </a:lnR>
-                    <a:lnT w="12700" cap="flat" cmpd="sng" algn="ctr">
-                      <a:noFill/>
-                      <a:prstDash val="solid"/>
-                      <a:round/>
-                      <a:headEnd type="none" w="med" len="med"/>
-                      <a:tailEnd type="none" w="med" len="med"/>
-                    </a:lnT>
-                    <a:lnB w="12700" cap="flat" cmpd="sng" algn="ctr">
-                      <a:noFill/>
-                      <a:prstDash val="solid"/>
-                      <a:round/>
-                      <a:headEnd type="none" w="med" len="med"/>
-                      <a:tailEnd type="none" w="med" len="med"/>
-                    </a:lnB>
-                  </a:tcPr>
-                </a:tc>
-                <a:extLst>
-                  <a:ext uri="{0D108BD9-81ED-4DB2-BD59-A6C34878D82A}">
-                    <a16:rowId xmlns:a16="http://schemas.microsoft.com/office/drawing/2014/main" val="934562184"/>
-                  </a:ext>
-                </a:extLst>
-              </a:tr>
-              <a:tr h="178635">
-                <a:tc>
-                  <a:txBody>
-                    <a:bodyPr/>
-                    <a:lstStyle/>
-                    <a:p>
-                      <a:r>
-                        <a:rPr lang="de-DE" sz="700" dirty="0" err="1"/>
-                        <a:t>row_id</a:t>
-                      </a:r>
-                      <a:endParaRPr lang="de-DE" sz="700" dirty="0"/>
-                    </a:p>
-                  </a:txBody>
-                  <a:tcPr>
-                    <a:lnL w="12700" cap="flat" cmpd="sng" algn="ctr">
-                      <a:solidFill>
-                        <a:schemeClr val="tx1"/>
-                      </a:solidFill>
-                      <a:prstDash val="solid"/>
-                      <a:round/>
-                      <a:headEnd type="none" w="med" len="med"/>
-                      <a:tailEnd type="none" w="med" len="med"/>
-                    </a:lnL>
-                    <a:lnR w="12700" cap="flat" cmpd="sng" algn="ctr">
-                      <a:solidFill>
-                        <a:schemeClr val="tx1"/>
-                      </a:solidFill>
-                      <a:prstDash val="solid"/>
-                      <a:round/>
-                      <a:headEnd type="none" w="med" len="med"/>
-                      <a:tailEnd type="none" w="med" len="med"/>
-                    </a:lnR>
-                    <a:lnT w="12700" cap="flat" cmpd="sng" algn="ctr">
-                      <a:noFill/>
-                      <a:prstDash val="solid"/>
-                      <a:round/>
-                      <a:headEnd type="none" w="med" len="med"/>
-                      <a:tailEnd type="none" w="med" len="med"/>
-                    </a:lnT>
-                    <a:lnB w="12700" cap="flat" cmpd="sng" algn="ctr">
-                      <a:noFill/>
-                      <a:prstDash val="solid"/>
-                      <a:round/>
-                      <a:headEnd type="none" w="med" len="med"/>
-                      <a:tailEnd type="none" w="med" len="med"/>
-                    </a:lnB>
-                  </a:tcPr>
-                </a:tc>
-                <a:tc>
-                  <a:txBody>
-                    <a:bodyPr/>
-                    <a:lstStyle/>
-                    <a:p>
-                      <a:r>
-                        <a:rPr lang="de-DE" sz="700" dirty="0" err="1"/>
-                        <a:t>int</a:t>
-                      </a:r>
-                      <a:endParaRPr lang="de-DE" sz="700" dirty="0"/>
-                    </a:p>
-                  </a:txBody>
-                  <a:tcPr>
-                    <a:lnL w="12700" cap="flat" cmpd="sng" algn="ctr">
-                      <a:solidFill>
-                        <a:schemeClr val="tx1"/>
-                      </a:solidFill>
-                      <a:prstDash val="solid"/>
-                      <a:round/>
-                      <a:headEnd type="none" w="med" len="med"/>
-                      <a:tailEnd type="none" w="med" len="med"/>
-                    </a:lnL>
-                    <a:lnR w="12700" cap="flat" cmpd="sng" algn="ctr">
-                      <a:solidFill>
-                        <a:schemeClr val="tx1"/>
-                      </a:solidFill>
-                      <a:prstDash val="solid"/>
-                      <a:round/>
-                      <a:headEnd type="none" w="med" len="med"/>
-                      <a:tailEnd type="none" w="med" len="med"/>
-                    </a:lnR>
-                    <a:lnT w="12700" cap="flat" cmpd="sng" algn="ctr">
-                      <a:noFill/>
-                      <a:prstDash val="solid"/>
-                      <a:round/>
-                      <a:headEnd type="none" w="med" len="med"/>
-                      <a:tailEnd type="none" w="med" len="med"/>
-                    </a:lnT>
-                    <a:lnB w="12700" cap="flat" cmpd="sng" algn="ctr">
-                      <a:noFill/>
-                      <a:prstDash val="solid"/>
-                      <a:round/>
-                      <a:headEnd type="none" w="med" len="med"/>
-                      <a:tailEnd type="none" w="med" len="med"/>
-                    </a:lnB>
-                  </a:tcPr>
-                </a:tc>
-                <a:extLst>
-                  <a:ext uri="{0D108BD9-81ED-4DB2-BD59-A6C34878D82A}">
-                    <a16:rowId xmlns:a16="http://schemas.microsoft.com/office/drawing/2014/main" val="3091389870"/>
-                  </a:ext>
-                </a:extLst>
-              </a:tr>
-              <a:tr h="178635">
-                <a:tc>
-                  <a:txBody>
-                    <a:bodyPr/>
-                    <a:lstStyle/>
-                    <a:p>
-                      <a:r>
-                        <a:rPr lang="de-DE" sz="700" dirty="0"/>
-                        <a:t>type</a:t>
-                      </a:r>
-                    </a:p>
-                  </a:txBody>
-                  <a:tcPr>
-                    <a:lnL w="12700" cap="flat" cmpd="sng" algn="ctr">
-                      <a:solidFill>
-                        <a:schemeClr val="tx1"/>
-                      </a:solidFill>
-                      <a:prstDash val="solid"/>
-                      <a:round/>
-                      <a:headEnd type="none" w="med" len="med"/>
-                      <a:tailEnd type="none" w="med" len="med"/>
-                    </a:lnL>
-                    <a:lnR w="12700" cap="flat" cmpd="sng" algn="ctr">
-                      <a:solidFill>
-                        <a:schemeClr val="tx1"/>
-                      </a:solidFill>
-                      <a:prstDash val="solid"/>
-                      <a:round/>
-                      <a:headEnd type="none" w="med" len="med"/>
-                      <a:tailEnd type="none" w="med" len="med"/>
-                    </a:lnR>
-                    <a:lnT w="12700" cap="flat" cmpd="sng" algn="ctr">
-                      <a:noFill/>
-                      <a:prstDash val="solid"/>
-                      <a:round/>
-                      <a:headEnd type="none" w="med" len="med"/>
-                      <a:tailEnd type="none" w="med" len="med"/>
-                    </a:lnT>
-                    <a:lnB w="12700" cap="flat" cmpd="sng" algn="ctr">
-                      <a:noFill/>
-                      <a:prstDash val="solid"/>
-                      <a:round/>
-                      <a:headEnd type="none" w="med" len="med"/>
-                      <a:tailEnd type="none" w="med" len="med"/>
-                    </a:lnB>
-                  </a:tcPr>
-                </a:tc>
-                <a:tc>
-                  <a:txBody>
-                    <a:bodyPr/>
-                    <a:lstStyle/>
-                    <a:p>
-                      <a:r>
-                        <a:rPr lang="de-DE" sz="700" dirty="0" err="1"/>
-                        <a:t>enum</a:t>
-                      </a:r>
-                      <a:r>
-                        <a:rPr lang="de-DE" sz="700" dirty="0"/>
-                        <a:t> {PDF, PNG,…}</a:t>
-                      </a:r>
-                    </a:p>
-                  </a:txBody>
-                  <a:tcPr>
-                    <a:lnL w="12700" cap="flat" cmpd="sng" algn="ctr">
-                      <a:solidFill>
-                        <a:schemeClr val="tx1"/>
-                      </a:solidFill>
-                      <a:prstDash val="solid"/>
-                      <a:round/>
-                      <a:headEnd type="none" w="med" len="med"/>
-                      <a:tailEnd type="none" w="med" len="med"/>
-                    </a:lnL>
-                    <a:lnR w="12700" cap="flat" cmpd="sng" algn="ctr">
-                      <a:solidFill>
-                        <a:schemeClr val="tx1"/>
-                      </a:solidFill>
-                      <a:prstDash val="solid"/>
-                      <a:round/>
-                      <a:headEnd type="none" w="med" len="med"/>
-                      <a:tailEnd type="none" w="med" len="med"/>
-                    </a:lnR>
-                    <a:lnT w="12700" cap="flat" cmpd="sng" algn="ctr">
-                      <a:noFill/>
-                      <a:prstDash val="solid"/>
-                      <a:round/>
-                      <a:headEnd type="none" w="med" len="med"/>
-                      <a:tailEnd type="none" w="med" len="med"/>
-                    </a:lnT>
-                    <a:lnB w="12700" cap="flat" cmpd="sng" algn="ctr">
-                      <a:noFill/>
-                      <a:prstDash val="solid"/>
-                      <a:round/>
-                      <a:headEnd type="none" w="med" len="med"/>
-                      <a:tailEnd type="none" w="med" len="med"/>
-                    </a:lnB>
-                  </a:tcPr>
-                </a:tc>
-                <a:extLst>
-                  <a:ext uri="{0D108BD9-81ED-4DB2-BD59-A6C34878D82A}">
-                    <a16:rowId xmlns:a16="http://schemas.microsoft.com/office/drawing/2014/main" val="2753685843"/>
-                  </a:ext>
-                </a:extLst>
-              </a:tr>
-              <a:tr h="178635">
-                <a:tc>
-                  <a:txBody>
-                    <a:bodyPr/>
-                    <a:lstStyle/>
-                    <a:p>
-                      <a:r>
-                        <a:rPr lang="de-DE" sz="700" dirty="0" err="1"/>
-                        <a:t>document</a:t>
-                      </a:r>
-                      <a:endParaRPr lang="de-DE" sz="700" dirty="0"/>
-                    </a:p>
-                  </a:txBody>
-                  <a:tcPr>
-                    <a:lnL w="12700" cap="flat" cmpd="sng" algn="ctr">
-                      <a:solidFill>
-                        <a:schemeClr val="tx1"/>
-                      </a:solidFill>
-                      <a:prstDash val="solid"/>
-                      <a:round/>
-                      <a:headEnd type="none" w="med" len="med"/>
-                      <a:tailEnd type="none" w="med" len="med"/>
-                    </a:lnL>
-                    <a:lnR w="12700" cap="flat" cmpd="sng" algn="ctr">
-                      <a:solidFill>
-                        <a:schemeClr val="tx1"/>
-                      </a:solidFill>
-                      <a:prstDash val="solid"/>
-                      <a:round/>
-                      <a:headEnd type="none" w="med" len="med"/>
-                      <a:tailEnd type="none" w="med" len="med"/>
-                    </a:lnR>
-                    <a:lnT w="12700" cap="flat" cmpd="sng" algn="ctr">
-                      <a:noFill/>
-                      <a:prstDash val="solid"/>
-                      <a:round/>
-                      <a:headEnd type="none" w="med" len="med"/>
-                      <a:tailEnd type="none" w="med" len="med"/>
-                    </a:lnT>
-                    <a:lnB w="12700" cap="flat" cmpd="sng" algn="ctr">
-                      <a:solidFill>
-                        <a:schemeClr val="tx1"/>
-                      </a:solidFill>
-                      <a:prstDash val="solid"/>
-                      <a:round/>
-                      <a:headEnd type="none" w="med" len="med"/>
-                      <a:tailEnd type="none" w="med" len="med"/>
-                    </a:lnB>
-                  </a:tcPr>
-                </a:tc>
-                <a:tc>
-                  <a:txBody>
-                    <a:bodyPr/>
-                    <a:lstStyle/>
-                    <a:p>
-                      <a:r>
-                        <a:rPr lang="de-DE" sz="700" dirty="0" err="1"/>
-                        <a:t>blob</a:t>
-                      </a:r>
-                      <a:endParaRPr lang="de-DE" sz="700" dirty="0"/>
-                    </a:p>
-                  </a:txBody>
-                  <a:tcPr>
-                    <a:lnL w="12700" cap="flat" cmpd="sng" algn="ctr">
-                      <a:solidFill>
-                        <a:schemeClr val="tx1"/>
-                      </a:solidFill>
-                      <a:prstDash val="solid"/>
-                      <a:round/>
-                      <a:headEnd type="none" w="med" len="med"/>
-                      <a:tailEnd type="none" w="med" len="med"/>
-                    </a:lnL>
-                    <a:lnR w="12700" cap="flat" cmpd="sng" algn="ctr">
-                      <a:solidFill>
-                        <a:schemeClr val="tx1"/>
-                      </a:solidFill>
-                      <a:prstDash val="solid"/>
-                      <a:round/>
-                      <a:headEnd type="none" w="med" len="med"/>
-                      <a:tailEnd type="none" w="med" len="med"/>
-                    </a:lnR>
-                    <a:lnT w="12700" cap="flat" cmpd="sng" algn="ctr">
-                      <a:noFill/>
-                      <a:prstDash val="solid"/>
-                      <a:round/>
-                      <a:headEnd type="none" w="med" len="med"/>
-                      <a:tailEnd type="none" w="med" len="med"/>
-                    </a:lnT>
-                    <a:lnB w="12700" cap="flat" cmpd="sng" algn="ctr">
-                      <a:solidFill>
-                        <a:schemeClr val="tx1"/>
-                      </a:solidFill>
-                      <a:prstDash val="solid"/>
-                      <a:round/>
-                      <a:headEnd type="none" w="med" len="med"/>
-                      <a:tailEnd type="none" w="med" len="med"/>
-                    </a:lnB>
-                  </a:tcPr>
-                </a:tc>
-                <a:extLst>
-                  <a:ext uri="{0D108BD9-81ED-4DB2-BD59-A6C34878D82A}">
-                    <a16:rowId xmlns:a16="http://schemas.microsoft.com/office/drawing/2014/main" val="1737684597"/>
-                  </a:ext>
-                </a:extLst>
-              </a:tr>
-            </a:tbl>
-          </a:graphicData>
-        </a:graphic>
-      </p:graphicFrame>
       <p:graphicFrame>
         <p:nvGraphicFramePr>
           <p:cNvPr id="4" name="Tabelle 3">
@@ -10617,14 +9313,14 @@
           <p:nvPr>
             <p:extLst>
               <p:ext uri="{D42A27DB-BD31-4B8C-83A1-F6EECF244321}">
-                <p14:modId xmlns:p14="http://schemas.microsoft.com/office/powerpoint/2010/main" val="2546623978"/>
+                <p14:modId xmlns:p14="http://schemas.microsoft.com/office/powerpoint/2010/main" val="1068107557"/>
               </p:ext>
             </p:extLst>
           </p:nvPr>
         </p:nvGraphicFramePr>
         <p:xfrm>
-          <a:off x="3005786" y="1049831"/>
-          <a:ext cx="1401497" cy="990600"/>
+          <a:off x="3005786" y="944089"/>
+          <a:ext cx="1401497" cy="1295400"/>
         </p:xfrm>
         <a:graphic>
           <a:graphicData uri="http://schemas.openxmlformats.org/drawingml/2006/table">
@@ -10633,14 +9329,14 @@
                 <a:tableStyleId>{2D5ABB26-0587-4C30-8999-92F81FD0307C}</a:tableStyleId>
               </a:tblPr>
               <a:tblGrid>
-                <a:gridCol w="916305">
+                <a:gridCol w="950394">
                   <a:extLst>
                     <a:ext uri="{9D8B030D-6E8A-4147-A177-3AD203B41FA5}">
                       <a16:colId xmlns:a16="http://schemas.microsoft.com/office/drawing/2014/main" val="650321458"/>
                     </a:ext>
                   </a:extLst>
                 </a:gridCol>
-                <a:gridCol w="485192">
+                <a:gridCol w="451103">
                   <a:extLst>
                     <a:ext uri="{9D8B030D-6E8A-4147-A177-3AD203B41FA5}">
                       <a16:colId xmlns:a16="http://schemas.microsoft.com/office/drawing/2014/main" val="4065165498"/>
@@ -10975,7 +9671,7 @@
                     <a:p>
                       <a:r>
                         <a:rPr lang="de-DE" sz="700" dirty="0" err="1"/>
-                        <a:t>variant_type_id</a:t>
+                        <a:t>annotation_type_id</a:t>
                       </a:r>
                       <a:endParaRPr lang="de-DE" sz="700" dirty="0"/>
                     </a:p>
@@ -11114,9 +9810,7 @@
                       <a:tailEnd type="none" w="med" len="med"/>
                     </a:lnT>
                     <a:lnB w="12700" cap="flat" cmpd="sng" algn="ctr">
-                      <a:solidFill>
-                        <a:schemeClr val="tx1"/>
-                      </a:solidFill>
+                      <a:noFill/>
                       <a:prstDash val="solid"/>
                       <a:round/>
                       <a:headEnd type="none" w="med" len="med"/>
@@ -11166,9 +9860,7 @@
                       <a:tailEnd type="none" w="med" len="med"/>
                     </a:lnT>
                     <a:lnB w="12700" cap="flat" cmpd="sng" algn="ctr">
-                      <a:solidFill>
-                        <a:schemeClr val="tx1"/>
-                      </a:solidFill>
+                      <a:noFill/>
                       <a:prstDash val="solid"/>
                       <a:round/>
                       <a:headEnd type="none" w="med" len="med"/>
@@ -11182,6 +9874,124 @@
                 <a:extLst>
                   <a:ext uri="{0D108BD9-81ED-4DB2-BD59-A6C34878D82A}">
                     <a16:rowId xmlns:a16="http://schemas.microsoft.com/office/drawing/2014/main" val="4115687846"/>
+                  </a:ext>
+                </a:extLst>
+              </a:tr>
+              <a:tr h="178635">
+                <a:tc>
+                  <a:txBody>
+                    <a:bodyPr/>
+                    <a:lstStyle/>
+                    <a:p>
+                      <a:r>
+                        <a:rPr lang="de-DE" sz="700" dirty="0" err="1"/>
+                        <a:t>supplementary_document</a:t>
+                      </a:r>
+                      <a:endParaRPr lang="de-DE" sz="700" dirty="0"/>
+                    </a:p>
+                  </a:txBody>
+                  <a:tcPr>
+                    <a:lnL w="12700" cap="flat" cmpd="sng" algn="ctr">
+                      <a:solidFill>
+                        <a:schemeClr val="tx1"/>
+                      </a:solidFill>
+                      <a:prstDash val="solid"/>
+                      <a:round/>
+                      <a:headEnd type="none" w="med" len="med"/>
+                      <a:tailEnd type="none" w="med" len="med"/>
+                    </a:lnL>
+                    <a:lnR w="12700" cap="flat" cmpd="sng" algn="ctr">
+                      <a:solidFill>
+                        <a:schemeClr val="tx1"/>
+                      </a:solidFill>
+                      <a:prstDash val="solid"/>
+                      <a:round/>
+                      <a:headEnd type="none" w="med" len="med"/>
+                      <a:tailEnd type="none" w="med" len="med"/>
+                    </a:lnR>
+                    <a:lnT w="12700" cap="flat" cmpd="sng" algn="ctr">
+                      <a:noFill/>
+                      <a:prstDash val="solid"/>
+                      <a:round/>
+                      <a:headEnd type="none" w="med" len="med"/>
+                      <a:tailEnd type="none" w="med" len="med"/>
+                    </a:lnT>
+                    <a:lnB w="12700" cap="flat" cmpd="sng" algn="ctr">
+                      <a:solidFill>
+                        <a:schemeClr val="tx1"/>
+                      </a:solidFill>
+                      <a:prstDash val="solid"/>
+                      <a:round/>
+                      <a:headEnd type="none" w="med" len="med"/>
+                      <a:tailEnd type="none" w="med" len="med"/>
+                    </a:lnB>
+                    <a:solidFill>
+                      <a:schemeClr val="bg1"/>
+                    </a:solidFill>
+                  </a:tcPr>
+                </a:tc>
+                <a:tc>
+                  <a:txBody>
+                    <a:bodyPr/>
+                    <a:lstStyle/>
+                    <a:p>
+                      <a:r>
+                        <a:rPr lang="de-DE" sz="700" dirty="0" err="1"/>
+                        <a:t>blob</a:t>
+                      </a:r>
+                      <a:r>
+                        <a:rPr lang="de-DE" sz="700" dirty="0"/>
+                        <a:t> </a:t>
+                      </a:r>
+                      <a:r>
+                        <a:rPr lang="de-DE" sz="700" b="1" dirty="0"/>
+                        <a:t>(n)</a:t>
+                      </a:r>
+                    </a:p>
+                  </a:txBody>
+                  <a:tcPr>
+                    <a:lnL w="12700" cap="flat" cmpd="sng" algn="ctr">
+                      <a:solidFill>
+                        <a:schemeClr val="tx1"/>
+                      </a:solidFill>
+                      <a:prstDash val="solid"/>
+                      <a:round/>
+                      <a:headEnd type="none" w="med" len="med"/>
+                      <a:tailEnd type="none" w="med" len="med"/>
+                    </a:lnL>
+                    <a:lnR w="12700" cap="flat" cmpd="sng" algn="ctr">
+                      <a:solidFill>
+                        <a:schemeClr val="tx1"/>
+                      </a:solidFill>
+                      <a:prstDash val="solid"/>
+                      <a:round/>
+                      <a:headEnd type="none" w="med" len="med"/>
+                      <a:tailEnd type="none" w="med" len="med"/>
+                    </a:lnR>
+                    <a:lnT w="12700" cap="flat" cmpd="sng" algn="ctr">
+                      <a:noFill/>
+                      <a:prstDash val="solid"/>
+                      <a:round/>
+                      <a:headEnd type="none" w="med" len="med"/>
+                      <a:tailEnd type="none" w="med" len="med"/>
+                    </a:lnT>
+                    <a:lnB w="12700" cap="flat" cmpd="sng" algn="ctr">
+                      <a:solidFill>
+                        <a:schemeClr val="tx1"/>
+                      </a:solidFill>
+                      <a:prstDash val="solid"/>
+                      <a:round/>
+                      <a:headEnd type="none" w="med" len="med"/>
+                      <a:tailEnd type="none" w="med" len="med"/>
+                    </a:lnB>
+                    <a:solidFill>
+                      <a:schemeClr val="bg1"/>
+                    </a:solidFill>
+                  </a:tcPr>
+                </a:tc>
+                <a:extLst>
+                  <a:ext uri="{0D108BD9-81ED-4DB2-BD59-A6C34878D82A}">
+                    <a16:rowId xmlns:a16="http://schemas.microsoft.com/office/drawing/2014/main" val="707576274"/>
                   </a:ext>
                 </a:extLst>
               </a:tr>
@@ -11204,14 +10014,14 @@
           <p:nvPr>
             <p:extLst>
               <p:ext uri="{D42A27DB-BD31-4B8C-83A1-F6EECF244321}">
-                <p14:modId xmlns:p14="http://schemas.microsoft.com/office/powerpoint/2010/main" val="1963343526"/>
+                <p14:modId xmlns:p14="http://schemas.microsoft.com/office/powerpoint/2010/main" val="2781418589"/>
               </p:ext>
             </p:extLst>
           </p:nvPr>
         </p:nvGraphicFramePr>
         <p:xfrm>
           <a:off x="8265638" y="3117097"/>
-          <a:ext cx="1407888" cy="1295400"/>
+          <a:ext cx="1407888" cy="1493520"/>
         </p:xfrm>
         <a:graphic>
           <a:graphicData uri="http://schemas.openxmlformats.org/drawingml/2006/table">
@@ -11345,10 +10155,18 @@
                     <a:lstStyle/>
                     <a:p>
                       <a:r>
-                        <a:rPr lang="de-DE" sz="700" dirty="0" err="1"/>
+                        <a:rPr lang="de-DE" sz="700" dirty="0" err="1">
+                          <a:solidFill>
+                            <a:schemeClr val="tx1"/>
+                          </a:solidFill>
+                        </a:rPr>
                         <a:t>id</a:t>
                       </a:r>
-                      <a:endParaRPr lang="de-DE" sz="700" dirty="0"/>
+                      <a:endParaRPr lang="de-DE" sz="700" dirty="0">
+                        <a:solidFill>
+                          <a:schemeClr val="tx1"/>
+                        </a:solidFill>
+                      </a:endParaRPr>
                     </a:p>
                   </a:txBody>
                   <a:tcPr>
@@ -11397,10 +10215,18 @@
                     <a:lstStyle/>
                     <a:p>
                       <a:r>
-                        <a:rPr lang="de-DE" sz="700" dirty="0" err="1"/>
+                        <a:rPr lang="de-DE" sz="700" dirty="0" err="1">
+                          <a:solidFill>
+                            <a:schemeClr val="tx1"/>
+                          </a:solidFill>
+                        </a:rPr>
                         <a:t>int</a:t>
                       </a:r>
-                      <a:endParaRPr lang="de-DE" sz="700" dirty="0"/>
+                      <a:endParaRPr lang="de-DE" sz="700" dirty="0">
+                        <a:solidFill>
+                          <a:schemeClr val="tx1"/>
+                        </a:solidFill>
+                      </a:endParaRPr>
                     </a:p>
                   </a:txBody>
                   <a:tcPr>
@@ -11729,10 +10555,6 @@
                         <a:rPr lang="de-DE" sz="700" dirty="0" err="1"/>
                         <a:t>text</a:t>
                       </a:r>
-                      <a:r>
-                        <a:rPr lang="de-DE" sz="700" b="1" i="1" dirty="0"/>
-                        <a:t> (n)</a:t>
-                      </a:r>
                       <a:endParaRPr lang="de-DE" sz="700" dirty="0"/>
                     </a:p>
                   </a:txBody>
@@ -11787,10 +10609,9 @@
                     <a:lstStyle/>
                     <a:p>
                       <a:r>
-                        <a:rPr lang="de-DE" sz="700" dirty="0" err="1"/>
-                        <a:t>submission_date</a:t>
+                        <a:rPr lang="de-DE" sz="700" dirty="0"/>
+                        <a:t>date</a:t>
                       </a:r>
-                      <a:endParaRPr lang="de-DE" sz="700" dirty="0"/>
                     </a:p>
                   </a:txBody>
                   <a:tcPr>
@@ -11820,9 +10641,7 @@
                       <a:tailEnd type="none" w="med" len="med"/>
                     </a:lnT>
                     <a:lnB w="12700" cap="flat" cmpd="sng" algn="ctr">
-                      <a:solidFill>
-                        <a:schemeClr val="tx1"/>
-                      </a:solidFill>
+                      <a:noFill/>
                       <a:prstDash val="solid"/>
                       <a:round/>
                       <a:headEnd type="none" w="med" len="med"/>
@@ -11871,9 +10690,7 @@
                       <a:tailEnd type="none" w="med" len="med"/>
                     </a:lnT>
                     <a:lnB w="12700" cap="flat" cmpd="sng" algn="ctr">
-                      <a:solidFill>
-                        <a:schemeClr val="tx1"/>
-                      </a:solidFill>
+                      <a:noFill/>
                       <a:prstDash val="solid"/>
                       <a:round/>
                       <a:headEnd type="none" w="med" len="med"/>
@@ -11887,6 +10704,117 @@
                 <a:extLst>
                   <a:ext uri="{0D108BD9-81ED-4DB2-BD59-A6C34878D82A}">
                     <a16:rowId xmlns:a16="http://schemas.microsoft.com/office/drawing/2014/main" val="1836843118"/>
+                  </a:ext>
+                </a:extLst>
+              </a:tr>
+              <a:tr h="178635">
+                <a:tc>
+                  <a:txBody>
+                    <a:bodyPr/>
+                    <a:lstStyle/>
+                    <a:p>
+                      <a:r>
+                        <a:rPr lang="de-DE" sz="700" dirty="0" err="1"/>
+                        <a:t>evidence_document</a:t>
+                      </a:r>
+                      <a:endParaRPr lang="de-DE" sz="700" dirty="0"/>
+                    </a:p>
+                  </a:txBody>
+                  <a:tcPr>
+                    <a:lnL w="12700" cap="flat" cmpd="sng" algn="ctr">
+                      <a:solidFill>
+                        <a:schemeClr val="tx1"/>
+                      </a:solidFill>
+                      <a:prstDash val="solid"/>
+                      <a:round/>
+                      <a:headEnd type="none" w="med" len="med"/>
+                      <a:tailEnd type="none" w="med" len="med"/>
+                    </a:lnL>
+                    <a:lnR w="12700" cap="flat" cmpd="sng" algn="ctr">
+                      <a:solidFill>
+                        <a:schemeClr val="tx1"/>
+                      </a:solidFill>
+                      <a:prstDash val="solid"/>
+                      <a:round/>
+                      <a:headEnd type="none" w="med" len="med"/>
+                      <a:tailEnd type="none" w="med" len="med"/>
+                    </a:lnR>
+                    <a:lnT w="12700" cap="flat" cmpd="sng" algn="ctr">
+                      <a:noFill/>
+                      <a:prstDash val="solid"/>
+                      <a:round/>
+                      <a:headEnd type="none" w="med" len="med"/>
+                      <a:tailEnd type="none" w="med" len="med"/>
+                    </a:lnT>
+                    <a:lnB w="12700" cap="flat" cmpd="sng" algn="ctr">
+                      <a:solidFill>
+                        <a:schemeClr val="tx1"/>
+                      </a:solidFill>
+                      <a:prstDash val="solid"/>
+                      <a:round/>
+                      <a:headEnd type="none" w="med" len="med"/>
+                      <a:tailEnd type="none" w="med" len="med"/>
+                    </a:lnB>
+                    <a:solidFill>
+                      <a:schemeClr val="bg1"/>
+                    </a:solidFill>
+                  </a:tcPr>
+                </a:tc>
+                <a:tc>
+                  <a:txBody>
+                    <a:bodyPr/>
+                    <a:lstStyle/>
+                    <a:p>
+                      <a:r>
+                        <a:rPr lang="de-DE" sz="700" dirty="0" err="1"/>
+                        <a:t>blob</a:t>
+                      </a:r>
+                      <a:endParaRPr lang="de-DE" sz="700" dirty="0"/>
+                    </a:p>
+                  </a:txBody>
+                  <a:tcPr>
+                    <a:lnL w="12700" cap="flat" cmpd="sng" algn="ctr">
+                      <a:solidFill>
+                        <a:schemeClr val="tx1"/>
+                      </a:solidFill>
+                      <a:prstDash val="solid"/>
+                      <a:round/>
+                      <a:headEnd type="none" w="med" len="med"/>
+                      <a:tailEnd type="none" w="med" len="med"/>
+                    </a:lnL>
+                    <a:lnR w="12700" cap="flat" cmpd="sng" algn="ctr">
+                      <a:solidFill>
+                        <a:schemeClr val="tx1"/>
+                      </a:solidFill>
+                      <a:prstDash val="solid"/>
+                      <a:round/>
+                      <a:headEnd type="none" w="med" len="med"/>
+                      <a:tailEnd type="none" w="med" len="med"/>
+                    </a:lnR>
+                    <a:lnT w="12700" cap="flat" cmpd="sng" algn="ctr">
+                      <a:noFill/>
+                      <a:prstDash val="solid"/>
+                      <a:round/>
+                      <a:headEnd type="none" w="med" len="med"/>
+                      <a:tailEnd type="none" w="med" len="med"/>
+                    </a:lnT>
+                    <a:lnB w="12700" cap="flat" cmpd="sng" algn="ctr">
+                      <a:solidFill>
+                        <a:schemeClr val="tx1"/>
+                      </a:solidFill>
+                      <a:prstDash val="solid"/>
+                      <a:round/>
+                      <a:headEnd type="none" w="med" len="med"/>
+                      <a:tailEnd type="none" w="med" len="med"/>
+                    </a:lnB>
+                    <a:solidFill>
+                      <a:schemeClr val="bg1"/>
+                    </a:solidFill>
+                  </a:tcPr>
+                </a:tc>
+                <a:extLst>
+                  <a:ext uri="{0D108BD9-81ED-4DB2-BD59-A6C34878D82A}">
+                    <a16:rowId xmlns:a16="http://schemas.microsoft.com/office/drawing/2014/main" val="2597879989"/>
                   </a:ext>
                 </a:extLst>
               </a:tr>
@@ -11955,7 +10883,7 @@
           <p:nvPr>
             <p:extLst>
               <p:ext uri="{D42A27DB-BD31-4B8C-83A1-F6EECF244321}">
-                <p14:modId xmlns:p14="http://schemas.microsoft.com/office/powerpoint/2010/main" val="2511686065"/>
+                <p14:modId xmlns:p14="http://schemas.microsoft.com/office/powerpoint/2010/main" val="1760069171"/>
               </p:ext>
             </p:extLst>
           </p:nvPr>
@@ -12585,10 +11513,7 @@
                         <a:rPr lang="de-DE" sz="700" dirty="0" err="1"/>
                         <a:t>text</a:t>
                       </a:r>
-                      <a:r>
-                        <a:rPr lang="de-DE" sz="700" b="1" i="1" dirty="0"/>
-                        <a:t> (n)</a:t>
-                      </a:r>
+                      <a:endParaRPr lang="de-DE" sz="700" b="1" i="1" dirty="0"/>
                     </a:p>
                   </a:txBody>
                   <a:tcPr>
@@ -12642,10 +11567,9 @@
                     <a:lstStyle/>
                     <a:p>
                       <a:r>
-                        <a:rPr lang="de-DE" sz="700" dirty="0" err="1"/>
-                        <a:t>submission_date</a:t>
+                        <a:rPr lang="de-DE" sz="700" dirty="0"/>
+                        <a:t>date</a:t>
                       </a:r>
-                      <a:endParaRPr lang="de-DE" sz="700" dirty="0"/>
                     </a:p>
                   </a:txBody>
                   <a:tcPr>
@@ -12810,7 +11734,7 @@
           <p:nvPr>
             <p:extLst>
               <p:ext uri="{D42A27DB-BD31-4B8C-83A1-F6EECF244321}">
-                <p14:modId xmlns:p14="http://schemas.microsoft.com/office/powerpoint/2010/main" val="1714192146"/>
+                <p14:modId xmlns:p14="http://schemas.microsoft.com/office/powerpoint/2010/main" val="351322315"/>
               </p:ext>
             </p:extLst>
           </p:nvPr>
@@ -13221,10 +12145,6 @@
                       <a:r>
                         <a:rPr lang="de-DE" sz="700" dirty="0" err="1"/>
                         <a:t>text</a:t>
-                      </a:r>
-                      <a:r>
-                        <a:rPr lang="de-DE" sz="700" b="1" i="1" dirty="0"/>
-                        <a:t> (n)</a:t>
                       </a:r>
                       <a:endParaRPr lang="de-DE" sz="700" dirty="0"/>
                     </a:p>
@@ -14650,6 +13570,1294 @@
 </file>
 
 <file path=ppt/slides/slide6.xml><?xml version="1.0" encoding="utf-8"?>
+<p:sld xmlns:a="http://schemas.openxmlformats.org/drawingml/2006/main" xmlns:r="http://schemas.openxmlformats.org/officeDocument/2006/relationships" xmlns:p="http://schemas.openxmlformats.org/presentationml/2006/main">
+  <p:cSld>
+    <p:spTree>
+      <p:nvGrpSpPr>
+        <p:cNvPr id="1" name=""/>
+        <p:cNvGrpSpPr/>
+        <p:nvPr/>
+      </p:nvGrpSpPr>
+      <p:grpSpPr>
+        <a:xfrm>
+          <a:off x="0" y="0"/>
+          <a:ext cx="0" cy="0"/>
+          <a:chOff x="0" y="0"/>
+          <a:chExt cx="0" cy="0"/>
+        </a:xfrm>
+      </p:grpSpPr>
+      <p:sp>
+        <p:nvSpPr>
+          <p:cNvPr id="2" name="Titel 1">
+            <a:extLst>
+              <a:ext uri="{FF2B5EF4-FFF2-40B4-BE49-F238E27FC236}">
+                <a16:creationId xmlns:a16="http://schemas.microsoft.com/office/drawing/2014/main" id="{1A73B91B-9FF1-45DF-8A28-C01C64410341}"/>
+              </a:ext>
+            </a:extLst>
+          </p:cNvPr>
+          <p:cNvSpPr>
+            <a:spLocks noGrp="1"/>
+          </p:cNvSpPr>
+          <p:nvPr>
+            <p:ph type="title"/>
+          </p:nvPr>
+        </p:nvSpPr>
+        <p:spPr>
+          <a:xfrm>
+            <a:off x="0" y="1"/>
+            <a:ext cx="10515600" cy="516294"/>
+          </a:xfrm>
+        </p:spPr>
+        <p:txBody>
+          <a:bodyPr/>
+          <a:lstStyle/>
+          <a:p>
+            <a:r>
+              <a:rPr lang="de-DE" sz="2800" dirty="0"/>
+              <a:t>Über DBs</a:t>
+            </a:r>
+            <a:endParaRPr lang="de-DE" dirty="0"/>
+          </a:p>
+        </p:txBody>
+      </p:sp>
+      <p:sp>
+        <p:nvSpPr>
+          <p:cNvPr id="3" name="Inhaltsplatzhalter 2">
+            <a:extLst>
+              <a:ext uri="{FF2B5EF4-FFF2-40B4-BE49-F238E27FC236}">
+                <a16:creationId xmlns:a16="http://schemas.microsoft.com/office/drawing/2014/main" id="{5FA699DC-99B6-4C85-B72B-CE37A450BB6B}"/>
+              </a:ext>
+            </a:extLst>
+          </p:cNvPr>
+          <p:cNvSpPr>
+            <a:spLocks noGrp="1"/>
+          </p:cNvSpPr>
+          <p:nvPr>
+            <p:ph idx="1"/>
+          </p:nvPr>
+        </p:nvSpPr>
+        <p:spPr>
+          <a:xfrm>
+            <a:off x="427652" y="780595"/>
+            <a:ext cx="11341359" cy="5794375"/>
+          </a:xfrm>
+        </p:spPr>
+        <p:txBody>
+          <a:bodyPr>
+            <a:normAutofit lnSpcReduction="10000"/>
+          </a:bodyPr>
+          <a:lstStyle/>
+          <a:p>
+            <a:r>
+              <a:rPr lang="de-DE" dirty="0" err="1"/>
+              <a:t>gnomAD</a:t>
+            </a:r>
+            <a:r>
+              <a:rPr lang="de-DE" dirty="0"/>
+              <a:t>: </a:t>
+            </a:r>
+            <a:r>
+              <a:rPr lang="de-DE" dirty="0" err="1"/>
+              <a:t>population</a:t>
+            </a:r>
+            <a:r>
+              <a:rPr lang="de-DE" dirty="0"/>
+              <a:t> </a:t>
+            </a:r>
+            <a:r>
+              <a:rPr lang="de-DE" dirty="0" err="1"/>
+              <a:t>specific</a:t>
+            </a:r>
+            <a:r>
+              <a:rPr lang="de-DE" dirty="0"/>
+              <a:t> allele </a:t>
+            </a:r>
+            <a:r>
+              <a:rPr lang="de-DE" dirty="0" err="1"/>
+              <a:t>frequencies</a:t>
+            </a:r>
+            <a:endParaRPr lang="de-DE" dirty="0"/>
+          </a:p>
+          <a:p>
+            <a:r>
+              <a:rPr lang="de-DE" dirty="0" err="1"/>
+              <a:t>clinVar</a:t>
+            </a:r>
+            <a:r>
+              <a:rPr lang="de-DE" dirty="0"/>
+              <a:t>: </a:t>
+            </a:r>
+            <a:r>
+              <a:rPr lang="en-US" dirty="0"/>
+              <a:t>relationships of human variations and phenotypes, with supporting evidence (</a:t>
+            </a:r>
+            <a:r>
+              <a:rPr lang="en-US" dirty="0" err="1"/>
+              <a:t>eg.</a:t>
+            </a:r>
+            <a:r>
+              <a:rPr lang="en-US" dirty="0"/>
+              <a:t> publications)</a:t>
+            </a:r>
+            <a:endParaRPr lang="de-DE" dirty="0"/>
+          </a:p>
+          <a:p>
+            <a:r>
+              <a:rPr lang="de-DE" dirty="0"/>
+              <a:t>VEP: </a:t>
+            </a:r>
+            <a:r>
+              <a:rPr lang="en-US" dirty="0"/>
+              <a:t>determines the effect of variants on genes, transcripts, protein sequences or regulatory regions (= consequence) but can do more with plugins</a:t>
+            </a:r>
+          </a:p>
+          <a:p>
+            <a:r>
+              <a:rPr lang="en-US" dirty="0" err="1"/>
+              <a:t>BRCAexchange</a:t>
+            </a:r>
+            <a:r>
+              <a:rPr lang="en-US" dirty="0"/>
+              <a:t>: contains sequence variations from the BRCA1&amp;2 genes along with clinical significance of them</a:t>
+            </a:r>
+          </a:p>
+          <a:p>
+            <a:r>
+              <a:rPr lang="en-US" dirty="0"/>
+              <a:t>FOSSIES: frequencies of variations within a couple of specific genes</a:t>
+            </a:r>
+          </a:p>
+          <a:p>
+            <a:r>
+              <a:rPr lang="en-US" dirty="0"/>
+              <a:t>ARUP BRCA1&amp;2: classification of variants within BRCA1&amp;2 genes</a:t>
+            </a:r>
+          </a:p>
+          <a:p>
+            <a:r>
+              <a:rPr lang="en-US" i="1" dirty="0"/>
+              <a:t>TP53</a:t>
+            </a:r>
+            <a:r>
+              <a:rPr lang="en-US" dirty="0"/>
+              <a:t> Database: various types of data and information from the literature and generalist databases on human </a:t>
+            </a:r>
+            <a:r>
+              <a:rPr lang="en-US" i="1" dirty="0"/>
+              <a:t>TP53</a:t>
+            </a:r>
+            <a:r>
+              <a:rPr lang="en-US" dirty="0"/>
+              <a:t> gene variations related to cancer</a:t>
+            </a:r>
+          </a:p>
+          <a:p>
+            <a:r>
+              <a:rPr lang="en-US" dirty="0" err="1"/>
+              <a:t>cancerhotspots</a:t>
+            </a:r>
+            <a:r>
+              <a:rPr lang="en-US" dirty="0"/>
+              <a:t>: statistically significant mutations in cancer </a:t>
+            </a:r>
+          </a:p>
+          <a:p>
+            <a:endParaRPr lang="de-DE" dirty="0"/>
+          </a:p>
+        </p:txBody>
+      </p:sp>
+    </p:spTree>
+    <p:extLst>
+      <p:ext uri="{BB962C8B-B14F-4D97-AF65-F5344CB8AC3E}">
+        <p14:creationId xmlns:p14="http://schemas.microsoft.com/office/powerpoint/2010/main" val="3575904585"/>
+      </p:ext>
+    </p:extLst>
+  </p:cSld>
+  <p:clrMapOvr>
+    <a:masterClrMapping/>
+  </p:clrMapOvr>
+</p:sld>
+</file>
+
+<file path=ppt/slides/slide7.xml><?xml version="1.0" encoding="utf-8"?>
+<p:sld xmlns:a="http://schemas.openxmlformats.org/drawingml/2006/main" xmlns:r="http://schemas.openxmlformats.org/officeDocument/2006/relationships" xmlns:p="http://schemas.openxmlformats.org/presentationml/2006/main">
+  <p:cSld>
+    <p:spTree>
+      <p:nvGrpSpPr>
+        <p:cNvPr id="1" name=""/>
+        <p:cNvGrpSpPr/>
+        <p:nvPr/>
+      </p:nvGrpSpPr>
+      <p:grpSpPr>
+        <a:xfrm>
+          <a:off x="0" y="0"/>
+          <a:ext cx="0" cy="0"/>
+          <a:chOff x="0" y="0"/>
+          <a:chExt cx="0" cy="0"/>
+        </a:xfrm>
+      </p:grpSpPr>
+      <p:sp>
+        <p:nvSpPr>
+          <p:cNvPr id="2" name="Titel 1">
+            <a:extLst>
+              <a:ext uri="{FF2B5EF4-FFF2-40B4-BE49-F238E27FC236}">
+                <a16:creationId xmlns:a16="http://schemas.microsoft.com/office/drawing/2014/main" id="{1A73B91B-9FF1-45DF-8A28-C01C64410341}"/>
+              </a:ext>
+            </a:extLst>
+          </p:cNvPr>
+          <p:cNvSpPr>
+            <a:spLocks noGrp="1"/>
+          </p:cNvSpPr>
+          <p:nvPr>
+            <p:ph type="title"/>
+          </p:nvPr>
+        </p:nvSpPr>
+        <p:spPr>
+          <a:xfrm>
+            <a:off x="0" y="1"/>
+            <a:ext cx="10515600" cy="516294"/>
+          </a:xfrm>
+        </p:spPr>
+        <p:txBody>
+          <a:bodyPr/>
+          <a:lstStyle/>
+          <a:p>
+            <a:r>
+              <a:rPr lang="de-DE" sz="2800" dirty="0"/>
+              <a:t>DB </a:t>
+            </a:r>
+            <a:r>
+              <a:rPr lang="de-DE" sz="2800" dirty="0" err="1"/>
+              <a:t>usage</a:t>
+            </a:r>
+            <a:endParaRPr lang="de-DE" dirty="0"/>
+          </a:p>
+        </p:txBody>
+      </p:sp>
+      <p:sp>
+        <p:nvSpPr>
+          <p:cNvPr id="3" name="Inhaltsplatzhalter 2">
+            <a:extLst>
+              <a:ext uri="{FF2B5EF4-FFF2-40B4-BE49-F238E27FC236}">
+                <a16:creationId xmlns:a16="http://schemas.microsoft.com/office/drawing/2014/main" id="{5FA699DC-99B6-4C85-B72B-CE37A450BB6B}"/>
+              </a:ext>
+            </a:extLst>
+          </p:cNvPr>
+          <p:cNvSpPr>
+            <a:spLocks noGrp="1"/>
+          </p:cNvSpPr>
+          <p:nvPr>
+            <p:ph idx="1"/>
+          </p:nvPr>
+        </p:nvSpPr>
+        <p:spPr>
+          <a:xfrm>
+            <a:off x="427652" y="780595"/>
+            <a:ext cx="11341359" cy="5794375"/>
+          </a:xfrm>
+        </p:spPr>
+        <p:txBody>
+          <a:bodyPr/>
+          <a:lstStyle/>
+          <a:p>
+            <a:r>
+              <a:rPr lang="de-DE" dirty="0" err="1"/>
+              <a:t>gnomAD</a:t>
+            </a:r>
+            <a:r>
+              <a:rPr lang="de-DE" dirty="0"/>
+              <a:t>: </a:t>
+            </a:r>
+            <a:r>
+              <a:rPr lang="de-DE" dirty="0" err="1"/>
+              <a:t>download</a:t>
+            </a:r>
+            <a:r>
+              <a:rPr lang="de-DE" dirty="0"/>
+              <a:t> </a:t>
+            </a:r>
+            <a:r>
+              <a:rPr lang="de-DE" dirty="0" err="1"/>
+              <a:t>data</a:t>
+            </a:r>
+            <a:r>
+              <a:rPr lang="de-DE" dirty="0"/>
+              <a:t>, </a:t>
+            </a:r>
+            <a:r>
+              <a:rPr lang="de-DE" dirty="0" err="1"/>
+              <a:t>probably</a:t>
+            </a:r>
+            <a:r>
+              <a:rPr lang="de-DE" dirty="0"/>
+              <a:t> </a:t>
+            </a:r>
+            <a:r>
+              <a:rPr lang="de-DE" dirty="0" err="1"/>
+              <a:t>version</a:t>
+            </a:r>
+            <a:r>
+              <a:rPr lang="de-DE" dirty="0"/>
+              <a:t> 3.1 (</a:t>
+            </a:r>
+            <a:r>
+              <a:rPr lang="de-DE" dirty="0" err="1"/>
+              <a:t>more</a:t>
+            </a:r>
+            <a:r>
+              <a:rPr lang="de-DE" dirty="0"/>
+              <a:t> </a:t>
+            </a:r>
+            <a:r>
+              <a:rPr lang="de-DE" dirty="0" err="1"/>
+              <a:t>data</a:t>
+            </a:r>
+            <a:r>
+              <a:rPr lang="de-DE" dirty="0"/>
+              <a:t> and </a:t>
+            </a:r>
+            <a:r>
+              <a:rPr lang="de-DE" dirty="0" err="1"/>
+              <a:t>built</a:t>
+            </a:r>
+            <a:r>
+              <a:rPr lang="de-DE" dirty="0"/>
+              <a:t> upon GRCh38), but </a:t>
+            </a:r>
+            <a:r>
+              <a:rPr lang="de-DE" dirty="0" err="1"/>
+              <a:t>gnomAD</a:t>
+            </a:r>
+            <a:r>
+              <a:rPr lang="de-DE" dirty="0"/>
+              <a:t> v2 </a:t>
+            </a:r>
+            <a:r>
+              <a:rPr lang="de-DE" dirty="0" err="1"/>
+              <a:t>is</a:t>
+            </a:r>
+            <a:r>
+              <a:rPr lang="de-DE" dirty="0"/>
+              <a:t> </a:t>
+            </a:r>
+            <a:r>
+              <a:rPr lang="de-DE" dirty="0" err="1"/>
+              <a:t>preferable</a:t>
+            </a:r>
+            <a:r>
+              <a:rPr lang="de-DE" dirty="0"/>
+              <a:t> </a:t>
+            </a:r>
+            <a:r>
+              <a:rPr lang="de-DE" dirty="0" err="1"/>
+              <a:t>over</a:t>
+            </a:r>
+            <a:r>
+              <a:rPr lang="de-DE" dirty="0"/>
+              <a:t> v3 </a:t>
+            </a:r>
+            <a:r>
+              <a:rPr lang="de-DE" dirty="0" err="1"/>
+              <a:t>for</a:t>
+            </a:r>
+            <a:r>
+              <a:rPr lang="de-DE" dirty="0"/>
+              <a:t> </a:t>
+            </a:r>
+            <a:r>
+              <a:rPr lang="de-DE" dirty="0" err="1"/>
+              <a:t>interpreting</a:t>
+            </a:r>
+            <a:r>
+              <a:rPr lang="de-DE" dirty="0"/>
+              <a:t> </a:t>
+            </a:r>
+            <a:r>
+              <a:rPr lang="de-DE" dirty="0" err="1"/>
+              <a:t>coding</a:t>
+            </a:r>
+            <a:br>
+              <a:rPr lang="de-DE" dirty="0"/>
+            </a:br>
+            <a:r>
+              <a:rPr lang="de-DE" dirty="0" err="1"/>
+              <a:t>variants</a:t>
+            </a:r>
+            <a:r>
+              <a:rPr lang="de-DE" dirty="0"/>
+              <a:t>.?</a:t>
+            </a:r>
+          </a:p>
+          <a:p>
+            <a:pPr lvl="1"/>
+            <a:r>
+              <a:rPr lang="de-DE" dirty="0"/>
+              <a:t>#</a:t>
+            </a:r>
+            <a:r>
+              <a:rPr lang="de-DE" dirty="0" err="1"/>
+              <a:t>hom</a:t>
+            </a:r>
+            <a:r>
+              <a:rPr lang="de-DE" dirty="0"/>
+              <a:t>/#</a:t>
+            </a:r>
+            <a:r>
+              <a:rPr lang="de-DE" dirty="0" err="1"/>
+              <a:t>hemi</a:t>
+            </a:r>
+            <a:r>
+              <a:rPr lang="de-DE" dirty="0"/>
+              <a:t>?</a:t>
+            </a:r>
+          </a:p>
+          <a:p>
+            <a:pPr lvl="1"/>
+            <a:r>
+              <a:rPr lang="de-DE" dirty="0"/>
+              <a:t>restliche daten aus VCF </a:t>
+            </a:r>
+            <a:r>
+              <a:rPr lang="de-DE" dirty="0" err="1"/>
+              <a:t>datei</a:t>
+            </a:r>
+            <a:r>
+              <a:rPr lang="de-DE" dirty="0"/>
+              <a:t> entnehmen (</a:t>
+            </a:r>
+            <a:r>
+              <a:rPr lang="de-DE" dirty="0" err="1"/>
+              <a:t>AF,popmax</a:t>
+            </a:r>
+            <a:r>
+              <a:rPr lang="de-DE" dirty="0"/>
+              <a:t> </a:t>
+            </a:r>
+            <a:r>
+              <a:rPr lang="de-DE" dirty="0" err="1"/>
+              <a:t>measures</a:t>
+            </a:r>
+            <a:r>
+              <a:rPr lang="de-DE" dirty="0"/>
+              <a:t>)</a:t>
+            </a:r>
+          </a:p>
+          <a:p>
+            <a:pPr lvl="1"/>
+            <a:r>
+              <a:rPr lang="de-DE" dirty="0" err="1"/>
+              <a:t>Clin</a:t>
+            </a:r>
+            <a:r>
+              <a:rPr lang="de-DE" dirty="0"/>
+              <a:t> Gen </a:t>
+            </a:r>
+            <a:r>
+              <a:rPr lang="de-DE" dirty="0" err="1"/>
+              <a:t>Sequencing</a:t>
+            </a:r>
+            <a:r>
+              <a:rPr lang="de-DE" dirty="0"/>
+              <a:t> Variant Interpretation (SVI)?</a:t>
+            </a:r>
+          </a:p>
+          <a:p>
+            <a:r>
+              <a:rPr lang="de-DE" dirty="0" err="1"/>
+              <a:t>clinvar</a:t>
+            </a:r>
+            <a:r>
+              <a:rPr lang="de-DE" dirty="0"/>
+              <a:t>: </a:t>
+            </a:r>
+            <a:r>
+              <a:rPr lang="de-DE" dirty="0" err="1"/>
+              <a:t>use</a:t>
+            </a:r>
+            <a:r>
+              <a:rPr lang="de-DE" dirty="0"/>
+              <a:t> API </a:t>
+            </a:r>
+            <a:r>
+              <a:rPr lang="de-DE" dirty="0" err="1"/>
+              <a:t>to</a:t>
+            </a:r>
+            <a:r>
+              <a:rPr lang="de-DE" dirty="0"/>
+              <a:t> </a:t>
+            </a:r>
+            <a:r>
+              <a:rPr lang="de-DE" dirty="0" err="1"/>
+              <a:t>fetch</a:t>
+            </a:r>
+            <a:r>
+              <a:rPr lang="de-DE" dirty="0"/>
+              <a:t> </a:t>
+            </a:r>
+            <a:r>
+              <a:rPr lang="de-DE" dirty="0" err="1"/>
+              <a:t>data</a:t>
+            </a:r>
+            <a:r>
+              <a:rPr lang="de-DE" dirty="0"/>
+              <a:t>: </a:t>
+            </a:r>
+            <a:r>
+              <a:rPr lang="de-DE" dirty="0" err="1"/>
+              <a:t>esearch</a:t>
+            </a:r>
+            <a:r>
+              <a:rPr lang="de-DE" dirty="0"/>
+              <a:t> -&gt; </a:t>
+            </a:r>
+            <a:r>
+              <a:rPr lang="de-DE" dirty="0" err="1"/>
+              <a:t>efetch</a:t>
+            </a:r>
+            <a:endParaRPr lang="de-DE" dirty="0"/>
+          </a:p>
+          <a:p>
+            <a:pPr lvl="1"/>
+            <a:r>
+              <a:rPr lang="en-US" dirty="0"/>
+              <a:t>Interpretation (last evaluated), Review status (Assertion criteria), Condition (Inheritance), Submitter, Supporting information from API</a:t>
+            </a:r>
+            <a:endParaRPr lang="de-DE" dirty="0"/>
+          </a:p>
+          <a:p>
+            <a:endParaRPr lang="de-DE" dirty="0"/>
+          </a:p>
+          <a:p>
+            <a:endParaRPr lang="de-DE" dirty="0"/>
+          </a:p>
+        </p:txBody>
+      </p:sp>
+      <p:pic>
+        <p:nvPicPr>
+          <p:cNvPr id="4" name="Grafik 3">
+            <a:extLst>
+              <a:ext uri="{FF2B5EF4-FFF2-40B4-BE49-F238E27FC236}">
+                <a16:creationId xmlns:a16="http://schemas.microsoft.com/office/drawing/2014/main" id="{EF5D8DCE-D3AB-46CD-9A42-D409A26FD177}"/>
+              </a:ext>
+            </a:extLst>
+          </p:cNvPr>
+          <p:cNvPicPr>
+            <a:picLocks noChangeAspect="1"/>
+          </p:cNvPicPr>
+          <p:nvPr/>
+        </p:nvPicPr>
+        <p:blipFill>
+          <a:blip r:embed="rId2"/>
+          <a:stretch>
+            <a:fillRect/>
+          </a:stretch>
+        </p:blipFill>
+        <p:spPr>
+          <a:xfrm>
+            <a:off x="1688385" y="4460033"/>
+            <a:ext cx="7971326" cy="1806834"/>
+          </a:xfrm>
+          <a:prstGeom prst="rect">
+            <a:avLst/>
+          </a:prstGeom>
+        </p:spPr>
+      </p:pic>
+    </p:spTree>
+    <p:extLst>
+      <p:ext uri="{BB962C8B-B14F-4D97-AF65-F5344CB8AC3E}">
+        <p14:creationId xmlns:p14="http://schemas.microsoft.com/office/powerpoint/2010/main" val="3011682897"/>
+      </p:ext>
+    </p:extLst>
+  </p:cSld>
+  <p:clrMapOvr>
+    <a:masterClrMapping/>
+  </p:clrMapOvr>
+</p:sld>
+</file>
+
+<file path=ppt/slides/slide8.xml><?xml version="1.0" encoding="utf-8"?>
+<p:sld xmlns:a="http://schemas.openxmlformats.org/drawingml/2006/main" xmlns:r="http://schemas.openxmlformats.org/officeDocument/2006/relationships" xmlns:p="http://schemas.openxmlformats.org/presentationml/2006/main">
+  <p:cSld>
+    <p:spTree>
+      <p:nvGrpSpPr>
+        <p:cNvPr id="1" name=""/>
+        <p:cNvGrpSpPr/>
+        <p:nvPr/>
+      </p:nvGrpSpPr>
+      <p:grpSpPr>
+        <a:xfrm>
+          <a:off x="0" y="0"/>
+          <a:ext cx="0" cy="0"/>
+          <a:chOff x="0" y="0"/>
+          <a:chExt cx="0" cy="0"/>
+        </a:xfrm>
+      </p:grpSpPr>
+      <p:sp>
+        <p:nvSpPr>
+          <p:cNvPr id="2" name="Titel 1">
+            <a:extLst>
+              <a:ext uri="{FF2B5EF4-FFF2-40B4-BE49-F238E27FC236}">
+                <a16:creationId xmlns:a16="http://schemas.microsoft.com/office/drawing/2014/main" id="{1A73B91B-9FF1-45DF-8A28-C01C64410341}"/>
+              </a:ext>
+            </a:extLst>
+          </p:cNvPr>
+          <p:cNvSpPr>
+            <a:spLocks noGrp="1"/>
+          </p:cNvSpPr>
+          <p:nvPr>
+            <p:ph type="title"/>
+          </p:nvPr>
+        </p:nvSpPr>
+        <p:spPr>
+          <a:xfrm>
+            <a:off x="0" y="1"/>
+            <a:ext cx="10515600" cy="516294"/>
+          </a:xfrm>
+        </p:spPr>
+        <p:txBody>
+          <a:bodyPr/>
+          <a:lstStyle/>
+          <a:p>
+            <a:r>
+              <a:rPr lang="de-DE" sz="2800" dirty="0"/>
+              <a:t>DB </a:t>
+            </a:r>
+            <a:r>
+              <a:rPr lang="de-DE" sz="2800" dirty="0" err="1"/>
+              <a:t>usage</a:t>
+            </a:r>
+            <a:endParaRPr lang="de-DE" dirty="0"/>
+          </a:p>
+        </p:txBody>
+      </p:sp>
+      <p:sp>
+        <p:nvSpPr>
+          <p:cNvPr id="3" name="Inhaltsplatzhalter 2">
+            <a:extLst>
+              <a:ext uri="{FF2B5EF4-FFF2-40B4-BE49-F238E27FC236}">
+                <a16:creationId xmlns:a16="http://schemas.microsoft.com/office/drawing/2014/main" id="{5FA699DC-99B6-4C85-B72B-CE37A450BB6B}"/>
+              </a:ext>
+            </a:extLst>
+          </p:cNvPr>
+          <p:cNvSpPr>
+            <a:spLocks noGrp="1"/>
+          </p:cNvSpPr>
+          <p:nvPr>
+            <p:ph idx="1"/>
+          </p:nvPr>
+        </p:nvSpPr>
+        <p:spPr>
+          <a:xfrm>
+            <a:off x="427652" y="780595"/>
+            <a:ext cx="11341359" cy="5794375"/>
+          </a:xfrm>
+        </p:spPr>
+        <p:txBody>
+          <a:bodyPr/>
+          <a:lstStyle/>
+          <a:p>
+            <a:r>
+              <a:rPr lang="de-DE" dirty="0"/>
+              <a:t>VEP: </a:t>
+            </a:r>
+            <a:r>
+              <a:rPr lang="de-DE" dirty="0" err="1"/>
+              <a:t>use</a:t>
+            </a:r>
+            <a:r>
+              <a:rPr lang="de-DE" dirty="0"/>
+              <a:t> </a:t>
+            </a:r>
+            <a:r>
+              <a:rPr lang="de-DE" dirty="0" err="1"/>
+              <a:t>api</a:t>
+            </a:r>
+            <a:r>
+              <a:rPr lang="de-DE" dirty="0"/>
+              <a:t> and </a:t>
+            </a:r>
+            <a:r>
+              <a:rPr lang="de-DE" dirty="0" err="1"/>
+              <a:t>local</a:t>
+            </a:r>
+            <a:r>
+              <a:rPr lang="de-DE" dirty="0"/>
+              <a:t> </a:t>
+            </a:r>
+            <a:r>
+              <a:rPr lang="de-DE" dirty="0" err="1"/>
+              <a:t>installation</a:t>
+            </a:r>
+            <a:endParaRPr lang="de-DE" dirty="0"/>
+          </a:p>
+          <a:p>
+            <a:pPr lvl="1"/>
+            <a:r>
+              <a:rPr lang="de-DE" dirty="0" err="1"/>
+              <a:t>consequence</a:t>
+            </a:r>
+            <a:r>
+              <a:rPr lang="de-DE" dirty="0"/>
+              <a:t> </a:t>
+            </a:r>
+            <a:r>
+              <a:rPr lang="de-DE" dirty="0" err="1"/>
+              <a:t>through</a:t>
+            </a:r>
+            <a:r>
+              <a:rPr lang="de-DE" dirty="0"/>
+              <a:t> GET </a:t>
+            </a:r>
+            <a:r>
+              <a:rPr lang="de-DE" dirty="0" err="1"/>
+              <a:t>vep</a:t>
+            </a:r>
+            <a:r>
+              <a:rPr lang="de-DE" dirty="0"/>
+              <a:t>/:</a:t>
+            </a:r>
+            <a:r>
+              <a:rPr lang="de-DE" dirty="0" err="1"/>
+              <a:t>species</a:t>
+            </a:r>
+            <a:r>
+              <a:rPr lang="de-DE" dirty="0"/>
+              <a:t>/</a:t>
+            </a:r>
+            <a:r>
+              <a:rPr lang="de-DE" dirty="0" err="1"/>
+              <a:t>region</a:t>
+            </a:r>
+            <a:r>
+              <a:rPr lang="de-DE" dirty="0"/>
+              <a:t>/:</a:t>
+            </a:r>
+            <a:r>
+              <a:rPr lang="de-DE" dirty="0" err="1"/>
+              <a:t>region</a:t>
+            </a:r>
+            <a:r>
+              <a:rPr lang="de-DE" dirty="0"/>
+              <a:t>/:allele/</a:t>
+            </a:r>
+          </a:p>
+          <a:p>
+            <a:pPr lvl="1"/>
+            <a:r>
+              <a:rPr lang="en-US" dirty="0" err="1"/>
+              <a:t>dbSNP</a:t>
+            </a:r>
+            <a:r>
+              <a:rPr lang="en-US" dirty="0"/>
+              <a:t> </a:t>
+            </a:r>
+            <a:r>
+              <a:rPr lang="en-US" dirty="0" err="1"/>
+              <a:t>rs</a:t>
+            </a:r>
+            <a:r>
+              <a:rPr lang="en-US" dirty="0"/>
+              <a:t> number via GET </a:t>
+            </a:r>
+            <a:r>
+              <a:rPr lang="en-US" dirty="0" err="1"/>
+              <a:t>variant_recoder</a:t>
+            </a:r>
+            <a:r>
+              <a:rPr lang="en-US" dirty="0"/>
+              <a:t>/:species/:id</a:t>
+            </a:r>
+          </a:p>
+          <a:p>
+            <a:pPr lvl="1"/>
+            <a:r>
+              <a:rPr lang="de-DE" dirty="0" err="1"/>
+              <a:t>phyloP</a:t>
+            </a:r>
+            <a:r>
+              <a:rPr lang="de-DE" dirty="0"/>
+              <a:t> </a:t>
+            </a:r>
+            <a:r>
+              <a:rPr lang="de-DE" dirty="0" err="1"/>
+              <a:t>scores</a:t>
+            </a:r>
+            <a:r>
+              <a:rPr lang="de-DE" dirty="0"/>
+              <a:t> (</a:t>
+            </a:r>
+            <a:r>
+              <a:rPr lang="de-DE" dirty="0" err="1"/>
+              <a:t>measure</a:t>
+            </a:r>
+            <a:r>
+              <a:rPr lang="de-DE" dirty="0"/>
+              <a:t> </a:t>
+            </a:r>
+            <a:r>
+              <a:rPr lang="de-DE" dirty="0" err="1"/>
+              <a:t>of</a:t>
+            </a:r>
+            <a:r>
+              <a:rPr lang="de-DE" dirty="0"/>
+              <a:t> </a:t>
+            </a:r>
+            <a:r>
+              <a:rPr lang="de-DE" dirty="0" err="1"/>
+              <a:t>sequence</a:t>
+            </a:r>
+            <a:r>
+              <a:rPr lang="de-DE" dirty="0"/>
+              <a:t> </a:t>
+            </a:r>
+            <a:r>
+              <a:rPr lang="de-DE" dirty="0" err="1"/>
+              <a:t>conservation</a:t>
+            </a:r>
+            <a:r>
+              <a:rPr lang="de-DE" dirty="0"/>
+              <a:t>) </a:t>
+            </a:r>
+            <a:r>
+              <a:rPr lang="de-DE" dirty="0" err="1"/>
+              <a:t>using</a:t>
+            </a:r>
+            <a:r>
+              <a:rPr lang="de-DE" dirty="0"/>
+              <a:t> </a:t>
+            </a:r>
+            <a:r>
+              <a:rPr lang="de-DE" dirty="0" err="1"/>
+              <a:t>the</a:t>
+            </a:r>
+            <a:r>
+              <a:rPr lang="de-DE" dirty="0"/>
+              <a:t> </a:t>
+            </a:r>
+            <a:r>
+              <a:rPr lang="de-DE" dirty="0" err="1"/>
+              <a:t>command</a:t>
+            </a:r>
+            <a:r>
+              <a:rPr lang="de-DE" dirty="0"/>
+              <a:t> </a:t>
+            </a:r>
+            <a:r>
+              <a:rPr lang="de-DE" dirty="0" err="1"/>
+              <a:t>line</a:t>
+            </a:r>
+            <a:r>
+              <a:rPr lang="de-DE" dirty="0"/>
+              <a:t> interface + </a:t>
+            </a:r>
+            <a:r>
+              <a:rPr lang="de-DE" dirty="0" err="1"/>
+              <a:t>plugin</a:t>
+            </a:r>
+            <a:r>
+              <a:rPr lang="de-DE" dirty="0"/>
+              <a:t> „</a:t>
+            </a:r>
+            <a:r>
+              <a:rPr lang="de-DE" dirty="0" err="1"/>
+              <a:t>conservation</a:t>
+            </a:r>
+            <a:r>
+              <a:rPr lang="de-DE" dirty="0"/>
+              <a:t>“</a:t>
+            </a:r>
+          </a:p>
+          <a:p>
+            <a:pPr lvl="1"/>
+            <a:r>
+              <a:rPr lang="de-DE" dirty="0"/>
+              <a:t> Proteindomänen?</a:t>
+            </a:r>
+          </a:p>
+          <a:p>
+            <a:pPr lvl="1"/>
+            <a:r>
+              <a:rPr lang="de-DE" dirty="0"/>
+              <a:t>CADD, REVEL, </a:t>
+            </a:r>
+            <a:r>
+              <a:rPr lang="de-DE" dirty="0" err="1"/>
+              <a:t>SpliceAI</a:t>
+            </a:r>
+            <a:r>
+              <a:rPr lang="de-DE" dirty="0"/>
+              <a:t>, </a:t>
+            </a:r>
+            <a:r>
+              <a:rPr lang="de-DE" dirty="0" err="1"/>
+              <a:t>MaxEntScan</a:t>
+            </a:r>
+            <a:r>
+              <a:rPr lang="de-DE" dirty="0"/>
+              <a:t> </a:t>
+            </a:r>
+            <a:r>
+              <a:rPr lang="de-DE" dirty="0" err="1"/>
+              <a:t>resuls</a:t>
+            </a:r>
+            <a:r>
+              <a:rPr lang="de-DE" dirty="0"/>
+              <a:t> </a:t>
+            </a:r>
+            <a:r>
+              <a:rPr lang="de-DE" dirty="0" err="1"/>
+              <a:t>using</a:t>
+            </a:r>
+            <a:r>
+              <a:rPr lang="de-DE" dirty="0"/>
+              <a:t> CLI + </a:t>
+            </a:r>
+            <a:r>
+              <a:rPr lang="de-DE" dirty="0" err="1"/>
+              <a:t>respective</a:t>
+            </a:r>
+            <a:r>
+              <a:rPr lang="de-DE" dirty="0"/>
+              <a:t> </a:t>
+            </a:r>
+            <a:r>
+              <a:rPr lang="de-DE" dirty="0" err="1"/>
+              <a:t>plugins</a:t>
+            </a:r>
+            <a:endParaRPr lang="de-DE" dirty="0"/>
+          </a:p>
+          <a:p>
+            <a:r>
+              <a:rPr lang="de-DE" dirty="0" err="1"/>
+              <a:t>BRCAexchange</a:t>
+            </a:r>
+            <a:r>
+              <a:rPr lang="de-DE" dirty="0"/>
+              <a:t>: </a:t>
+            </a:r>
+            <a:r>
+              <a:rPr lang="de-DE" dirty="0" err="1"/>
+              <a:t>extract</a:t>
+            </a:r>
+            <a:r>
+              <a:rPr lang="de-DE" dirty="0"/>
+              <a:t> </a:t>
+            </a:r>
+            <a:r>
+              <a:rPr lang="de-DE" dirty="0" err="1"/>
+              <a:t>clinical</a:t>
+            </a:r>
+            <a:r>
+              <a:rPr lang="de-DE" dirty="0"/>
+              <a:t> </a:t>
+            </a:r>
+            <a:r>
+              <a:rPr lang="de-DE" dirty="0" err="1"/>
+              <a:t>significance</a:t>
+            </a:r>
+            <a:r>
+              <a:rPr lang="de-DE" dirty="0"/>
+              <a:t> </a:t>
+            </a:r>
+            <a:r>
+              <a:rPr lang="de-DE" dirty="0" err="1"/>
+              <a:t>from</a:t>
+            </a:r>
+            <a:r>
+              <a:rPr lang="de-DE" dirty="0"/>
+              <a:t> </a:t>
+            </a:r>
+            <a:r>
+              <a:rPr lang="de-DE" dirty="0" err="1"/>
+              <a:t>api</a:t>
+            </a:r>
+            <a:endParaRPr lang="de-DE" dirty="0"/>
+          </a:p>
+          <a:p>
+            <a:r>
+              <a:rPr lang="de-DE" dirty="0"/>
+              <a:t>FOSSIES: </a:t>
+            </a:r>
+            <a:r>
+              <a:rPr lang="de-DE" dirty="0" err="1"/>
+              <a:t>extract</a:t>
+            </a:r>
+            <a:r>
+              <a:rPr lang="de-DE" dirty="0"/>
+              <a:t> </a:t>
+            </a:r>
+            <a:r>
+              <a:rPr lang="de-DE" dirty="0" err="1"/>
+              <a:t>european</a:t>
+            </a:r>
+            <a:r>
+              <a:rPr lang="de-DE" dirty="0"/>
+              <a:t> </a:t>
+            </a:r>
+            <a:r>
+              <a:rPr lang="de-DE" dirty="0" err="1"/>
+              <a:t>american</a:t>
+            </a:r>
+            <a:r>
+              <a:rPr lang="de-DE" dirty="0"/>
+              <a:t> and </a:t>
+            </a:r>
+            <a:r>
+              <a:rPr lang="de-DE" dirty="0" err="1"/>
+              <a:t>african</a:t>
+            </a:r>
+            <a:r>
+              <a:rPr lang="de-DE" dirty="0"/>
+              <a:t> </a:t>
+            </a:r>
+            <a:r>
+              <a:rPr lang="de-DE" dirty="0" err="1"/>
+              <a:t>american</a:t>
+            </a:r>
+            <a:r>
+              <a:rPr lang="de-DE" dirty="0"/>
+              <a:t> </a:t>
+            </a:r>
+            <a:r>
+              <a:rPr lang="de-DE" dirty="0" err="1"/>
+              <a:t>counts</a:t>
+            </a:r>
+            <a:r>
+              <a:rPr lang="de-DE" dirty="0"/>
+              <a:t> </a:t>
+            </a:r>
+            <a:r>
+              <a:rPr lang="de-DE" b="1" dirty="0"/>
+              <a:t>?</a:t>
+            </a:r>
+            <a:r>
+              <a:rPr lang="de-DE" b="1" dirty="0" err="1"/>
+              <a:t>access</a:t>
+            </a:r>
+            <a:r>
+              <a:rPr lang="de-DE" b="1" dirty="0"/>
+              <a:t>?</a:t>
+            </a:r>
+          </a:p>
+          <a:p>
+            <a:r>
+              <a:rPr lang="de-DE" dirty="0"/>
+              <a:t>ARUP BRCA1&amp;2: </a:t>
+            </a:r>
+            <a:r>
+              <a:rPr lang="de-DE" dirty="0" err="1"/>
+              <a:t>extract</a:t>
+            </a:r>
+            <a:r>
+              <a:rPr lang="de-DE" dirty="0"/>
+              <a:t> </a:t>
+            </a:r>
+            <a:r>
+              <a:rPr lang="de-DE" dirty="0" err="1"/>
+              <a:t>classifications</a:t>
+            </a:r>
+            <a:r>
+              <a:rPr lang="de-DE" dirty="0"/>
+              <a:t> </a:t>
+            </a:r>
+            <a:r>
+              <a:rPr lang="de-DE" b="1" dirty="0"/>
+              <a:t>?</a:t>
+            </a:r>
+            <a:r>
+              <a:rPr lang="de-DE" b="1" dirty="0" err="1"/>
+              <a:t>access</a:t>
+            </a:r>
+            <a:r>
+              <a:rPr lang="de-DE" b="1" dirty="0"/>
+              <a:t>?</a:t>
+            </a:r>
+          </a:p>
+          <a:p>
+            <a:r>
+              <a:rPr lang="de-DE" dirty="0"/>
+              <a:t>IARC TP53: </a:t>
+            </a:r>
+            <a:r>
+              <a:rPr lang="de-DE" dirty="0" err="1"/>
+              <a:t>extract</a:t>
+            </a:r>
+            <a:r>
+              <a:rPr lang="de-DE" dirty="0"/>
+              <a:t> </a:t>
+            </a:r>
+            <a:r>
+              <a:rPr lang="de-DE" dirty="0" err="1"/>
+              <a:t>classifications</a:t>
+            </a:r>
+            <a:r>
+              <a:rPr lang="de-DE" dirty="0"/>
+              <a:t> + </a:t>
+            </a:r>
+            <a:r>
+              <a:rPr lang="de-DE" dirty="0" err="1"/>
+              <a:t>functional</a:t>
+            </a:r>
+            <a:r>
+              <a:rPr lang="de-DE" dirty="0"/>
+              <a:t> </a:t>
+            </a:r>
+            <a:r>
+              <a:rPr lang="de-DE" dirty="0" err="1"/>
+              <a:t>predictions</a:t>
+            </a:r>
+            <a:r>
+              <a:rPr lang="de-DE" dirty="0"/>
+              <a:t> </a:t>
+            </a:r>
+            <a:r>
+              <a:rPr lang="de-DE" b="1" dirty="0"/>
+              <a:t>?</a:t>
+            </a:r>
+            <a:r>
+              <a:rPr lang="de-DE" b="1" dirty="0" err="1"/>
+              <a:t>access</a:t>
+            </a:r>
+            <a:r>
+              <a:rPr lang="de-DE" b="1" dirty="0"/>
+              <a:t>?</a:t>
+            </a:r>
+          </a:p>
+          <a:p>
+            <a:r>
+              <a:rPr lang="de-DE" dirty="0" err="1"/>
+              <a:t>cancerhotspots</a:t>
+            </a:r>
+            <a:r>
+              <a:rPr lang="de-DE" dirty="0"/>
+              <a:t>: </a:t>
+            </a:r>
+            <a:r>
+              <a:rPr lang="de-DE" dirty="0" err="1"/>
+              <a:t>need</a:t>
+            </a:r>
+            <a:r>
+              <a:rPr lang="de-DE" dirty="0"/>
+              <a:t> </a:t>
+            </a:r>
+            <a:r>
+              <a:rPr lang="de-DE" dirty="0" err="1"/>
+              <a:t>to</a:t>
+            </a:r>
+            <a:r>
+              <a:rPr lang="de-DE" dirty="0"/>
+              <a:t> </a:t>
+            </a:r>
+            <a:r>
+              <a:rPr lang="de-DE" dirty="0" err="1"/>
+              <a:t>go</a:t>
+            </a:r>
+            <a:r>
+              <a:rPr lang="de-DE" dirty="0"/>
+              <a:t> </a:t>
+            </a:r>
+            <a:r>
+              <a:rPr lang="de-DE" dirty="0" err="1"/>
+              <a:t>from</a:t>
+            </a:r>
+            <a:r>
+              <a:rPr lang="de-DE" dirty="0"/>
+              <a:t> </a:t>
+            </a:r>
+            <a:r>
+              <a:rPr lang="de-DE" dirty="0" err="1"/>
+              <a:t>protein</a:t>
+            </a:r>
+            <a:r>
+              <a:rPr lang="de-DE" dirty="0"/>
+              <a:t> </a:t>
+            </a:r>
+            <a:r>
+              <a:rPr lang="de-DE" dirty="0" err="1"/>
+              <a:t>variation</a:t>
+            </a:r>
+            <a:r>
+              <a:rPr lang="de-DE" dirty="0"/>
+              <a:t> </a:t>
+            </a:r>
+            <a:r>
+              <a:rPr lang="de-DE" dirty="0" err="1"/>
+              <a:t>to</a:t>
+            </a:r>
+            <a:r>
+              <a:rPr lang="de-DE" dirty="0"/>
+              <a:t> </a:t>
+            </a:r>
+            <a:r>
+              <a:rPr lang="de-DE" dirty="0" err="1"/>
+              <a:t>sequence</a:t>
+            </a:r>
+            <a:r>
+              <a:rPr lang="de-DE" dirty="0"/>
+              <a:t> </a:t>
+            </a:r>
+            <a:r>
+              <a:rPr lang="de-DE" dirty="0" err="1"/>
+              <a:t>variation</a:t>
+            </a:r>
+            <a:r>
+              <a:rPr lang="de-DE" dirty="0"/>
+              <a:t>, </a:t>
+            </a:r>
+            <a:r>
+              <a:rPr lang="de-DE" dirty="0" err="1"/>
+              <a:t>data</a:t>
+            </a:r>
+            <a:r>
+              <a:rPr lang="de-DE" dirty="0"/>
+              <a:t> </a:t>
+            </a:r>
+            <a:r>
+              <a:rPr lang="de-DE" dirty="0" err="1"/>
+              <a:t>needs</a:t>
+            </a:r>
+            <a:r>
+              <a:rPr lang="de-DE" dirty="0"/>
+              <a:t> </a:t>
+            </a:r>
+            <a:r>
+              <a:rPr lang="de-DE" dirty="0" err="1"/>
+              <a:t>to</a:t>
+            </a:r>
+            <a:r>
+              <a:rPr lang="de-DE" dirty="0"/>
+              <a:t> </a:t>
+            </a:r>
+            <a:r>
+              <a:rPr lang="de-DE" dirty="0" err="1"/>
+              <a:t>be</a:t>
+            </a:r>
+            <a:r>
+              <a:rPr lang="de-DE" dirty="0"/>
+              <a:t> </a:t>
+            </a:r>
+            <a:r>
+              <a:rPr lang="de-DE" dirty="0" err="1"/>
+              <a:t>downloaded</a:t>
+            </a:r>
+            <a:endParaRPr lang="de-DE" dirty="0"/>
+          </a:p>
+        </p:txBody>
+      </p:sp>
+    </p:spTree>
+    <p:extLst>
+      <p:ext uri="{BB962C8B-B14F-4D97-AF65-F5344CB8AC3E}">
+        <p14:creationId xmlns:p14="http://schemas.microsoft.com/office/powerpoint/2010/main" val="1337325651"/>
+      </p:ext>
+    </p:extLst>
+  </p:cSld>
+  <p:clrMapOvr>
+    <a:masterClrMapping/>
+  </p:clrMapOvr>
+</p:sld>
+</file>
+
+<file path=ppt/slides/slide9.xml><?xml version="1.0" encoding="utf-8"?>
 <p:sld xmlns:a="http://schemas.openxmlformats.org/drawingml/2006/main" xmlns:r="http://schemas.openxmlformats.org/officeDocument/2006/relationships" xmlns:p="http://schemas.openxmlformats.org/presentationml/2006/main">
   <p:cSld>
     <p:spTree>

</xml_diff>

<commit_message>
Added quick database access through simple web-based frontened Added first version of the annotation service
</commit_message>
<xml_diff>
--- a/doc/presentations/02_03_22_project_sketch.pptx
+++ b/doc/presentations/02_03_22_project_sketch.pptx
@@ -205,7 +205,7 @@
           <a:p>
             <a:fld id="{32D3377B-B692-4F8C-8BE9-143A32B75211}" type="datetimeFigureOut">
               <a:rPr lang="de-DE" smtClean="0"/>
-              <a:t>04.03.2022</a:t>
+              <a:t>08.03.2022</a:t>
             </a:fld>
             <a:endParaRPr lang="de-DE"/>
           </a:p>
@@ -703,7 +703,7 @@
           <a:p>
             <a:fld id="{1887EDC2-B1DE-4E8C-96F7-0082F16C6727}" type="datetimeFigureOut">
               <a:rPr lang="de-DE" smtClean="0"/>
-              <a:t>04.03.2022</a:t>
+              <a:t>08.03.2022</a:t>
             </a:fld>
             <a:endParaRPr lang="de-DE"/>
           </a:p>
@@ -901,7 +901,7 @@
           <a:p>
             <a:fld id="{1887EDC2-B1DE-4E8C-96F7-0082F16C6727}" type="datetimeFigureOut">
               <a:rPr lang="de-DE" smtClean="0"/>
-              <a:t>04.03.2022</a:t>
+              <a:t>08.03.2022</a:t>
             </a:fld>
             <a:endParaRPr lang="de-DE"/>
           </a:p>
@@ -1109,7 +1109,7 @@
           <a:p>
             <a:fld id="{1887EDC2-B1DE-4E8C-96F7-0082F16C6727}" type="datetimeFigureOut">
               <a:rPr lang="de-DE" smtClean="0"/>
-              <a:t>04.03.2022</a:t>
+              <a:t>08.03.2022</a:t>
             </a:fld>
             <a:endParaRPr lang="de-DE"/>
           </a:p>
@@ -1307,7 +1307,7 @@
           <a:p>
             <a:fld id="{1887EDC2-B1DE-4E8C-96F7-0082F16C6727}" type="datetimeFigureOut">
               <a:rPr lang="de-DE" smtClean="0"/>
-              <a:t>04.03.2022</a:t>
+              <a:t>08.03.2022</a:t>
             </a:fld>
             <a:endParaRPr lang="de-DE"/>
           </a:p>
@@ -1582,7 +1582,7 @@
           <a:p>
             <a:fld id="{1887EDC2-B1DE-4E8C-96F7-0082F16C6727}" type="datetimeFigureOut">
               <a:rPr lang="de-DE" smtClean="0"/>
-              <a:t>04.03.2022</a:t>
+              <a:t>08.03.2022</a:t>
             </a:fld>
             <a:endParaRPr lang="de-DE"/>
           </a:p>
@@ -1847,7 +1847,7 @@
           <a:p>
             <a:fld id="{1887EDC2-B1DE-4E8C-96F7-0082F16C6727}" type="datetimeFigureOut">
               <a:rPr lang="de-DE" smtClean="0"/>
-              <a:t>04.03.2022</a:t>
+              <a:t>08.03.2022</a:t>
             </a:fld>
             <a:endParaRPr lang="de-DE"/>
           </a:p>
@@ -2259,7 +2259,7 @@
           <a:p>
             <a:fld id="{1887EDC2-B1DE-4E8C-96F7-0082F16C6727}" type="datetimeFigureOut">
               <a:rPr lang="de-DE" smtClean="0"/>
-              <a:t>04.03.2022</a:t>
+              <a:t>08.03.2022</a:t>
             </a:fld>
             <a:endParaRPr lang="de-DE"/>
           </a:p>
@@ -2400,7 +2400,7 @@
           <a:p>
             <a:fld id="{1887EDC2-B1DE-4E8C-96F7-0082F16C6727}" type="datetimeFigureOut">
               <a:rPr lang="de-DE" smtClean="0"/>
-              <a:t>04.03.2022</a:t>
+              <a:t>08.03.2022</a:t>
             </a:fld>
             <a:endParaRPr lang="de-DE"/>
           </a:p>
@@ -2513,7 +2513,7 @@
           <a:p>
             <a:fld id="{1887EDC2-B1DE-4E8C-96F7-0082F16C6727}" type="datetimeFigureOut">
               <a:rPr lang="de-DE" smtClean="0"/>
-              <a:t>04.03.2022</a:t>
+              <a:t>08.03.2022</a:t>
             </a:fld>
             <a:endParaRPr lang="de-DE"/>
           </a:p>
@@ -2824,7 +2824,7 @@
           <a:p>
             <a:fld id="{1887EDC2-B1DE-4E8C-96F7-0082F16C6727}" type="datetimeFigureOut">
               <a:rPr lang="de-DE" smtClean="0"/>
-              <a:t>04.03.2022</a:t>
+              <a:t>08.03.2022</a:t>
             </a:fld>
             <a:endParaRPr lang="de-DE"/>
           </a:p>
@@ -3112,7 +3112,7 @@
           <a:p>
             <a:fld id="{1887EDC2-B1DE-4E8C-96F7-0082F16C6727}" type="datetimeFigureOut">
               <a:rPr lang="de-DE" smtClean="0"/>
-              <a:t>04.03.2022</a:t>
+              <a:t>08.03.2022</a:t>
             </a:fld>
             <a:endParaRPr lang="de-DE"/>
           </a:p>
@@ -3353,7 +3353,7 @@
           <a:p>
             <a:fld id="{1887EDC2-B1DE-4E8C-96F7-0082F16C6727}" type="datetimeFigureOut">
               <a:rPr lang="de-DE" smtClean="0"/>
-              <a:t>04.03.2022</a:t>
+              <a:t>08.03.2022</a:t>
             </a:fld>
             <a:endParaRPr lang="de-DE"/>
           </a:p>
@@ -6315,7 +6315,7 @@
           <p:nvPr>
             <p:extLst>
               <p:ext uri="{D42A27DB-BD31-4B8C-83A1-F6EECF244321}">
-                <p14:modId xmlns:p14="http://schemas.microsoft.com/office/powerpoint/2010/main" val="282203696"/>
+                <p14:modId xmlns:p14="http://schemas.microsoft.com/office/powerpoint/2010/main" val="1928672934"/>
               </p:ext>
             </p:extLst>
           </p:nvPr>
@@ -6885,14 +6885,6 @@
                     <a:bodyPr/>
                     <a:lstStyle/>
                     <a:p>
-                      <a:r>
-                        <a:rPr lang="de-DE" sz="700" dirty="0" err="1"/>
-                        <a:t>text</a:t>
-                      </a:r>
-                      <a:r>
-                        <a:rPr lang="de-DE" sz="700" dirty="0"/>
-                        <a:t>/</a:t>
-                      </a:r>
                       <a:r>
                         <a:rPr lang="de-DE" sz="700" dirty="0" err="1"/>
                         <a:t>int</a:t>

</xml_diff>